<commit_message>
Atualização dos arquivos de seminário
</commit_message>
<xml_diff>
--- a/Seminario/Optimal Clusters V2.pptx
+++ b/Seminario/Optimal Clusters V2.pptx
@@ -5,7 +5,7 @@
     <p:sldMasterId id="2147483648" r:id="rId1"/>
   </p:sldMasterIdLst>
   <p:notesMasterIdLst>
-    <p:notesMasterId r:id="rId28"/>
+    <p:notesMasterId r:id="rId27"/>
   </p:notesMasterIdLst>
   <p:sldIdLst>
     <p:sldId id="257" r:id="rId2"/>
@@ -13,27 +13,26 @@
     <p:sldId id="259" r:id="rId4"/>
     <p:sldId id="263" r:id="rId5"/>
     <p:sldId id="260" r:id="rId6"/>
-    <p:sldId id="261" r:id="rId7"/>
-    <p:sldId id="264" r:id="rId8"/>
-    <p:sldId id="266" r:id="rId9"/>
-    <p:sldId id="269" r:id="rId10"/>
-    <p:sldId id="270" r:id="rId11"/>
-    <p:sldId id="272" r:id="rId12"/>
-    <p:sldId id="273" r:id="rId13"/>
-    <p:sldId id="274" r:id="rId14"/>
-    <p:sldId id="286" r:id="rId15"/>
-    <p:sldId id="288" r:id="rId16"/>
-    <p:sldId id="290" r:id="rId17"/>
-    <p:sldId id="294" r:id="rId18"/>
-    <p:sldId id="296" r:id="rId19"/>
-    <p:sldId id="289" r:id="rId20"/>
-    <p:sldId id="303" r:id="rId21"/>
-    <p:sldId id="298" r:id="rId22"/>
-    <p:sldId id="300" r:id="rId23"/>
-    <p:sldId id="302" r:id="rId24"/>
-    <p:sldId id="304" r:id="rId25"/>
-    <p:sldId id="306" r:id="rId26"/>
-    <p:sldId id="279" r:id="rId27"/>
+    <p:sldId id="264" r:id="rId7"/>
+    <p:sldId id="266" r:id="rId8"/>
+    <p:sldId id="269" r:id="rId9"/>
+    <p:sldId id="270" r:id="rId10"/>
+    <p:sldId id="272" r:id="rId11"/>
+    <p:sldId id="273" r:id="rId12"/>
+    <p:sldId id="274" r:id="rId13"/>
+    <p:sldId id="286" r:id="rId14"/>
+    <p:sldId id="288" r:id="rId15"/>
+    <p:sldId id="290" r:id="rId16"/>
+    <p:sldId id="294" r:id="rId17"/>
+    <p:sldId id="296" r:id="rId18"/>
+    <p:sldId id="289" r:id="rId19"/>
+    <p:sldId id="303" r:id="rId20"/>
+    <p:sldId id="298" r:id="rId21"/>
+    <p:sldId id="300" r:id="rId22"/>
+    <p:sldId id="302" r:id="rId23"/>
+    <p:sldId id="304" r:id="rId24"/>
+    <p:sldId id="306" r:id="rId25"/>
+    <p:sldId id="279" r:id="rId26"/>
   </p:sldIdLst>
   <p:sldSz cx="12192000" cy="6858000"/>
   <p:notesSz cx="6858000" cy="9144000"/>
@@ -132,6 +131,11 @@
       </a:defRPr>
     </a:lvl9pPr>
   </p:defaultTextStyle>
+  <p:extLst>
+    <p:ext uri="{EFAFB233-063F-42B5-8137-9DF3F51BA10A}">
+      <p15:sldGuideLst xmlns:p15="http://schemas.microsoft.com/office/powerpoint/2012/main"/>
+    </p:ext>
+  </p:extLst>
 </p:presentation>
 </file>
 
@@ -217,7 +221,7 @@
           <a:p>
             <a:fld id="{77F42454-F8E5-4448-9889-8156D3A2DC09}" type="datetimeFigureOut">
               <a:rPr lang="pt-BR" smtClean="0"/>
-              <a:t>11/05/2024</a:t>
+              <a:t>23/05/2024</a:t>
             </a:fld>
             <a:endParaRPr lang="pt-BR"/>
           </a:p>
@@ -661,7 +665,7 @@
     </p:spTree>
     <p:extLst>
       <p:ext uri="{BB962C8B-B14F-4D97-AF65-F5344CB8AC3E}">
-        <p14:creationId xmlns:p14="http://schemas.microsoft.com/office/powerpoint/2010/main" val="3474525065"/>
+        <p14:creationId xmlns:p14="http://schemas.microsoft.com/office/powerpoint/2010/main" val="63392856"/>
       </p:ext>
     </p:extLst>
   </p:cSld>
@@ -764,7 +768,7 @@
     </p:spTree>
     <p:extLst>
       <p:ext uri="{BB962C8B-B14F-4D97-AF65-F5344CB8AC3E}">
-        <p14:creationId xmlns:p14="http://schemas.microsoft.com/office/powerpoint/2010/main" val="63392856"/>
+        <p14:creationId xmlns:p14="http://schemas.microsoft.com/office/powerpoint/2010/main" val="1718927862"/>
       </p:ext>
     </p:extLst>
   </p:cSld>
@@ -867,7 +871,7 @@
     </p:spTree>
     <p:extLst>
       <p:ext uri="{BB962C8B-B14F-4D97-AF65-F5344CB8AC3E}">
-        <p14:creationId xmlns:p14="http://schemas.microsoft.com/office/powerpoint/2010/main" val="1718927862"/>
+        <p14:creationId xmlns:p14="http://schemas.microsoft.com/office/powerpoint/2010/main" val="3328700659"/>
       </p:ext>
     </p:extLst>
   </p:cSld>
@@ -970,7 +974,7 @@
     </p:spTree>
     <p:extLst>
       <p:ext uri="{BB962C8B-B14F-4D97-AF65-F5344CB8AC3E}">
-        <p14:creationId xmlns:p14="http://schemas.microsoft.com/office/powerpoint/2010/main" val="3328700659"/>
+        <p14:creationId xmlns:p14="http://schemas.microsoft.com/office/powerpoint/2010/main" val="2806590157"/>
       </p:ext>
     </p:extLst>
   </p:cSld>
@@ -1073,7 +1077,7 @@
     </p:spTree>
     <p:extLst>
       <p:ext uri="{BB962C8B-B14F-4D97-AF65-F5344CB8AC3E}">
-        <p14:creationId xmlns:p14="http://schemas.microsoft.com/office/powerpoint/2010/main" val="2806590157"/>
+        <p14:creationId xmlns:p14="http://schemas.microsoft.com/office/powerpoint/2010/main" val="1474958269"/>
       </p:ext>
     </p:extLst>
   </p:cSld>
@@ -1176,7 +1180,7 @@
     </p:spTree>
     <p:extLst>
       <p:ext uri="{BB962C8B-B14F-4D97-AF65-F5344CB8AC3E}">
-        <p14:creationId xmlns:p14="http://schemas.microsoft.com/office/powerpoint/2010/main" val="1474958269"/>
+        <p14:creationId xmlns:p14="http://schemas.microsoft.com/office/powerpoint/2010/main" val="3792122736"/>
       </p:ext>
     </p:extLst>
   </p:cSld>
@@ -1279,7 +1283,7 @@
     </p:spTree>
     <p:extLst>
       <p:ext uri="{BB962C8B-B14F-4D97-AF65-F5344CB8AC3E}">
-        <p14:creationId xmlns:p14="http://schemas.microsoft.com/office/powerpoint/2010/main" val="3792122736"/>
+        <p14:creationId xmlns:p14="http://schemas.microsoft.com/office/powerpoint/2010/main" val="518639076"/>
       </p:ext>
     </p:extLst>
   </p:cSld>
@@ -1382,7 +1386,7 @@
     </p:spTree>
     <p:extLst>
       <p:ext uri="{BB962C8B-B14F-4D97-AF65-F5344CB8AC3E}">
-        <p14:creationId xmlns:p14="http://schemas.microsoft.com/office/powerpoint/2010/main" val="518639076"/>
+        <p14:creationId xmlns:p14="http://schemas.microsoft.com/office/powerpoint/2010/main" val="2731064738"/>
       </p:ext>
     </p:extLst>
   </p:cSld>
@@ -1485,7 +1489,7 @@
     </p:spTree>
     <p:extLst>
       <p:ext uri="{BB962C8B-B14F-4D97-AF65-F5344CB8AC3E}">
-        <p14:creationId xmlns:p14="http://schemas.microsoft.com/office/powerpoint/2010/main" val="2731064738"/>
+        <p14:creationId xmlns:p14="http://schemas.microsoft.com/office/powerpoint/2010/main" val="3351529671"/>
       </p:ext>
     </p:extLst>
   </p:cSld>
@@ -1588,7 +1592,7 @@
     </p:spTree>
     <p:extLst>
       <p:ext uri="{BB962C8B-B14F-4D97-AF65-F5344CB8AC3E}">
-        <p14:creationId xmlns:p14="http://schemas.microsoft.com/office/powerpoint/2010/main" val="3351529671"/>
+        <p14:creationId xmlns:p14="http://schemas.microsoft.com/office/powerpoint/2010/main" val="691202473"/>
       </p:ext>
     </p:extLst>
   </p:cSld>
@@ -1775,7 +1779,7 @@
     </p:spTree>
     <p:extLst>
       <p:ext uri="{BB962C8B-B14F-4D97-AF65-F5344CB8AC3E}">
-        <p14:creationId xmlns:p14="http://schemas.microsoft.com/office/powerpoint/2010/main" val="691202473"/>
+        <p14:creationId xmlns:p14="http://schemas.microsoft.com/office/powerpoint/2010/main" val="4023659816"/>
       </p:ext>
     </p:extLst>
   </p:cSld>
@@ -1878,7 +1882,7 @@
     </p:spTree>
     <p:extLst>
       <p:ext uri="{BB962C8B-B14F-4D97-AF65-F5344CB8AC3E}">
-        <p14:creationId xmlns:p14="http://schemas.microsoft.com/office/powerpoint/2010/main" val="4023659816"/>
+        <p14:creationId xmlns:p14="http://schemas.microsoft.com/office/powerpoint/2010/main" val="4147307061"/>
       </p:ext>
     </p:extLst>
   </p:cSld>
@@ -1981,7 +1985,7 @@
     </p:spTree>
     <p:extLst>
       <p:ext uri="{BB962C8B-B14F-4D97-AF65-F5344CB8AC3E}">
-        <p14:creationId xmlns:p14="http://schemas.microsoft.com/office/powerpoint/2010/main" val="4147307061"/>
+        <p14:creationId xmlns:p14="http://schemas.microsoft.com/office/powerpoint/2010/main" val="3643755109"/>
       </p:ext>
     </p:extLst>
   </p:cSld>
@@ -2076,109 +2080,6 @@
             <a:fld id="{5E0A5BA6-946D-4582-8BDA-25D6682E6A6A}" type="slidenum">
               <a:rPr lang="pt-BR" smtClean="0"/>
               <a:t>24</a:t>
-            </a:fld>
-            <a:endParaRPr lang="pt-BR"/>
-          </a:p>
-        </p:txBody>
-      </p:sp>
-    </p:spTree>
-    <p:extLst>
-      <p:ext uri="{BB962C8B-B14F-4D97-AF65-F5344CB8AC3E}">
-        <p14:creationId xmlns:p14="http://schemas.microsoft.com/office/powerpoint/2010/main" val="3643755109"/>
-      </p:ext>
-    </p:extLst>
-  </p:cSld>
-  <p:clrMapOvr>
-    <a:masterClrMapping/>
-  </p:clrMapOvr>
-</p:notes>
-</file>
-
-<file path=ppt/notesSlides/notesSlide24.xml><?xml version="1.0" encoding="utf-8"?>
-<p:notes xmlns:a="http://schemas.openxmlformats.org/drawingml/2006/main" xmlns:r="http://schemas.openxmlformats.org/officeDocument/2006/relationships" xmlns:p="http://schemas.openxmlformats.org/presentationml/2006/main">
-  <p:cSld>
-    <p:spTree>
-      <p:nvGrpSpPr>
-        <p:cNvPr id="1" name=""/>
-        <p:cNvGrpSpPr/>
-        <p:nvPr/>
-      </p:nvGrpSpPr>
-      <p:grpSpPr>
-        <a:xfrm>
-          <a:off x="0" y="0"/>
-          <a:ext cx="0" cy="0"/>
-          <a:chOff x="0" y="0"/>
-          <a:chExt cx="0" cy="0"/>
-        </a:xfrm>
-      </p:grpSpPr>
-      <p:sp>
-        <p:nvSpPr>
-          <p:cNvPr id="2" name="Espaço Reservado para Imagem de Slide 1"/>
-          <p:cNvSpPr>
-            <a:spLocks noGrp="1" noRot="1" noChangeAspect="1"/>
-          </p:cNvSpPr>
-          <p:nvPr>
-            <p:ph type="sldImg"/>
-          </p:nvPr>
-        </p:nvSpPr>
-        <p:spPr/>
-      </p:sp>
-      <p:sp>
-        <p:nvSpPr>
-          <p:cNvPr id="3" name="Espaço Reservado para Anotações 2"/>
-          <p:cNvSpPr>
-            <a:spLocks noGrp="1"/>
-          </p:cNvSpPr>
-          <p:nvPr>
-            <p:ph type="body" idx="1"/>
-          </p:nvPr>
-        </p:nvSpPr>
-        <p:spPr/>
-        <p:txBody>
-          <a:bodyPr/>
-          <a:lstStyle/>
-          <a:p>
-            <a:r>
-              <a:rPr lang="pt-BR" dirty="0"/>
-              <a:t>Os procedimentos </a:t>
-            </a:r>
-            <a:r>
-              <a:rPr lang="pt-BR" dirty="0" err="1"/>
-              <a:t>aglomerativos</a:t>
-            </a:r>
-            <a:r>
-              <a:rPr lang="pt-BR" dirty="0"/>
-              <a:t> começam com n clusters </a:t>
-            </a:r>
-            <a:r>
-              <a:rPr lang="pt-BR" dirty="0" err="1"/>
-              <a:t>singleton</a:t>
-            </a:r>
-            <a:r>
-              <a:rPr lang="pt-BR" dirty="0"/>
-              <a:t> e, em seguida, formam uma sequência mesclando clusters sucessivamente</a:t>
-            </a:r>
-          </a:p>
-        </p:txBody>
-      </p:sp>
-      <p:sp>
-        <p:nvSpPr>
-          <p:cNvPr id="4" name="Espaço Reservado para Número de Slide 3"/>
-          <p:cNvSpPr>
-            <a:spLocks noGrp="1"/>
-          </p:cNvSpPr>
-          <p:nvPr>
-            <p:ph type="sldNum" sz="quarter" idx="5"/>
-          </p:nvPr>
-        </p:nvSpPr>
-        <p:spPr/>
-        <p:txBody>
-          <a:bodyPr/>
-          <a:lstStyle/>
-          <a:p>
-            <a:fld id="{5E0A5BA6-946D-4582-8BDA-25D6682E6A6A}" type="slidenum">
-              <a:rPr lang="pt-BR" smtClean="0"/>
-              <a:t>25</a:t>
             </a:fld>
             <a:endParaRPr lang="pt-BR"/>
           </a:p>
@@ -2514,7 +2415,7 @@
     </p:spTree>
     <p:extLst>
       <p:ext uri="{BB962C8B-B14F-4D97-AF65-F5344CB8AC3E}">
-        <p14:creationId xmlns:p14="http://schemas.microsoft.com/office/powerpoint/2010/main" val="2942311743"/>
+        <p14:creationId xmlns:p14="http://schemas.microsoft.com/office/powerpoint/2010/main" val="3713875077"/>
       </p:ext>
     </p:extLst>
   </p:cSld>
@@ -2568,7 +2469,26 @@
           <a:bodyPr/>
           <a:lstStyle/>
           <a:p>
-            <a:endParaRPr lang="pt-BR" dirty="0"/>
+            <a:r>
+              <a:rPr lang="pt-BR" dirty="0"/>
+              <a:t>Os procedimentos </a:t>
+            </a:r>
+            <a:r>
+              <a:rPr lang="pt-BR" dirty="0" err="1"/>
+              <a:t>aglomerativos</a:t>
+            </a:r>
+            <a:r>
+              <a:rPr lang="pt-BR" dirty="0"/>
+              <a:t> começam com n clusters </a:t>
+            </a:r>
+            <a:r>
+              <a:rPr lang="pt-BR" dirty="0" err="1"/>
+              <a:t>singleton</a:t>
+            </a:r>
+            <a:r>
+              <a:rPr lang="pt-BR" dirty="0"/>
+              <a:t> e, em seguida, formam uma sequência mesclando clusters sucessivamente</a:t>
+            </a:r>
           </a:p>
         </p:txBody>
       </p:sp>
@@ -2598,7 +2518,7 @@
     </p:spTree>
     <p:extLst>
       <p:ext uri="{BB962C8B-B14F-4D97-AF65-F5344CB8AC3E}">
-        <p14:creationId xmlns:p14="http://schemas.microsoft.com/office/powerpoint/2010/main" val="3713875077"/>
+        <p14:creationId xmlns:p14="http://schemas.microsoft.com/office/powerpoint/2010/main" val="3947878283"/>
       </p:ext>
     </p:extLst>
   </p:cSld>
@@ -2701,7 +2621,7 @@
     </p:spTree>
     <p:extLst>
       <p:ext uri="{BB962C8B-B14F-4D97-AF65-F5344CB8AC3E}">
-        <p14:creationId xmlns:p14="http://schemas.microsoft.com/office/powerpoint/2010/main" val="3947878283"/>
+        <p14:creationId xmlns:p14="http://schemas.microsoft.com/office/powerpoint/2010/main" val="3901057305"/>
       </p:ext>
     </p:extLst>
   </p:cSld>
@@ -2804,7 +2724,7 @@
     </p:spTree>
     <p:extLst>
       <p:ext uri="{BB962C8B-B14F-4D97-AF65-F5344CB8AC3E}">
-        <p14:creationId xmlns:p14="http://schemas.microsoft.com/office/powerpoint/2010/main" val="3901057305"/>
+        <p14:creationId xmlns:p14="http://schemas.microsoft.com/office/powerpoint/2010/main" val="753717833"/>
       </p:ext>
     </p:extLst>
   </p:cSld>
@@ -2907,7 +2827,7 @@
     </p:spTree>
     <p:extLst>
       <p:ext uri="{BB962C8B-B14F-4D97-AF65-F5344CB8AC3E}">
-        <p14:creationId xmlns:p14="http://schemas.microsoft.com/office/powerpoint/2010/main" val="753717833"/>
+        <p14:creationId xmlns:p14="http://schemas.microsoft.com/office/powerpoint/2010/main" val="3474525065"/>
       </p:ext>
     </p:extLst>
   </p:cSld>
@@ -3064,7 +2984,7 @@
           <a:p>
             <a:fld id="{8C15FD2E-C8FA-413F-967B-D393CA7492D4}" type="datetimeFigureOut">
               <a:rPr lang="pt-BR" smtClean="0"/>
-              <a:t>11/05/2024</a:t>
+              <a:t>23/05/2024</a:t>
             </a:fld>
             <a:endParaRPr lang="pt-BR"/>
           </a:p>
@@ -3262,7 +3182,7 @@
           <a:p>
             <a:fld id="{8C15FD2E-C8FA-413F-967B-D393CA7492D4}" type="datetimeFigureOut">
               <a:rPr lang="pt-BR" smtClean="0"/>
-              <a:t>11/05/2024</a:t>
+              <a:t>23/05/2024</a:t>
             </a:fld>
             <a:endParaRPr lang="pt-BR"/>
           </a:p>
@@ -3470,7 +3390,7 @@
           <a:p>
             <a:fld id="{8C15FD2E-C8FA-413F-967B-D393CA7492D4}" type="datetimeFigureOut">
               <a:rPr lang="pt-BR" smtClean="0"/>
-              <a:t>11/05/2024</a:t>
+              <a:t>23/05/2024</a:t>
             </a:fld>
             <a:endParaRPr lang="pt-BR"/>
           </a:p>
@@ -3668,7 +3588,7 @@
           <a:p>
             <a:fld id="{8C15FD2E-C8FA-413F-967B-D393CA7492D4}" type="datetimeFigureOut">
               <a:rPr lang="pt-BR" smtClean="0"/>
-              <a:t>11/05/2024</a:t>
+              <a:t>23/05/2024</a:t>
             </a:fld>
             <a:endParaRPr lang="pt-BR"/>
           </a:p>
@@ -3943,7 +3863,7 @@
           <a:p>
             <a:fld id="{8C15FD2E-C8FA-413F-967B-D393CA7492D4}" type="datetimeFigureOut">
               <a:rPr lang="pt-BR" smtClean="0"/>
-              <a:t>11/05/2024</a:t>
+              <a:t>23/05/2024</a:t>
             </a:fld>
             <a:endParaRPr lang="pt-BR"/>
           </a:p>
@@ -4208,7 +4128,7 @@
           <a:p>
             <a:fld id="{8C15FD2E-C8FA-413F-967B-D393CA7492D4}" type="datetimeFigureOut">
               <a:rPr lang="pt-BR" smtClean="0"/>
-              <a:t>11/05/2024</a:t>
+              <a:t>23/05/2024</a:t>
             </a:fld>
             <a:endParaRPr lang="pt-BR"/>
           </a:p>
@@ -4620,7 +4540,7 @@
           <a:p>
             <a:fld id="{8C15FD2E-C8FA-413F-967B-D393CA7492D4}" type="datetimeFigureOut">
               <a:rPr lang="pt-BR" smtClean="0"/>
-              <a:t>11/05/2024</a:t>
+              <a:t>23/05/2024</a:t>
             </a:fld>
             <a:endParaRPr lang="pt-BR"/>
           </a:p>
@@ -4761,7 +4681,7 @@
           <a:p>
             <a:fld id="{8C15FD2E-C8FA-413F-967B-D393CA7492D4}" type="datetimeFigureOut">
               <a:rPr lang="pt-BR" smtClean="0"/>
-              <a:t>11/05/2024</a:t>
+              <a:t>23/05/2024</a:t>
             </a:fld>
             <a:endParaRPr lang="pt-BR"/>
           </a:p>
@@ -4874,7 +4794,7 @@
           <a:p>
             <a:fld id="{8C15FD2E-C8FA-413F-967B-D393CA7492D4}" type="datetimeFigureOut">
               <a:rPr lang="pt-BR" smtClean="0"/>
-              <a:t>11/05/2024</a:t>
+              <a:t>23/05/2024</a:t>
             </a:fld>
             <a:endParaRPr lang="pt-BR"/>
           </a:p>
@@ -5185,7 +5105,7 @@
           <a:p>
             <a:fld id="{8C15FD2E-C8FA-413F-967B-D393CA7492D4}" type="datetimeFigureOut">
               <a:rPr lang="pt-BR" smtClean="0"/>
-              <a:t>11/05/2024</a:t>
+              <a:t>23/05/2024</a:t>
             </a:fld>
             <a:endParaRPr lang="pt-BR"/>
           </a:p>
@@ -5473,7 +5393,7 @@
           <a:p>
             <a:fld id="{8C15FD2E-C8FA-413F-967B-D393CA7492D4}" type="datetimeFigureOut">
               <a:rPr lang="pt-BR" smtClean="0"/>
-              <a:t>11/05/2024</a:t>
+              <a:t>23/05/2024</a:t>
             </a:fld>
             <a:endParaRPr lang="pt-BR"/>
           </a:p>
@@ -5714,7 +5634,7 @@
           <a:p>
             <a:fld id="{8C15FD2E-C8FA-413F-967B-D393CA7492D4}" type="datetimeFigureOut">
               <a:rPr lang="pt-BR" smtClean="0"/>
-              <a:t>11/05/2024</a:t>
+              <a:t>23/05/2024</a:t>
             </a:fld>
             <a:endParaRPr lang="pt-BR"/>
           </a:p>
@@ -6321,6 +6241,67 @@
           </a:extLst>
         </p:spPr>
       </p:pic>
+      <p:sp>
+        <p:nvSpPr>
+          <p:cNvPr id="6" name="Retângulo 5">
+            <a:extLst>
+              <a:ext uri="{FF2B5EF4-FFF2-40B4-BE49-F238E27FC236}">
+                <a16:creationId xmlns:a16="http://schemas.microsoft.com/office/drawing/2014/main" id="{CB9BD1DF-87A9-A22C-2C1D-A101D930238C}"/>
+              </a:ext>
+            </a:extLst>
+          </p:cNvPr>
+          <p:cNvSpPr/>
+          <p:nvPr/>
+        </p:nvSpPr>
+        <p:spPr>
+          <a:xfrm>
+            <a:off x="11712388" y="6349004"/>
+            <a:ext cx="439271" cy="480110"/>
+          </a:xfrm>
+          <a:prstGeom prst="rect">
+            <a:avLst/>
+          </a:prstGeom>
+          <a:solidFill>
+            <a:schemeClr val="bg1"/>
+          </a:solidFill>
+          <a:ln>
+            <a:solidFill>
+              <a:schemeClr val="bg1"/>
+            </a:solidFill>
+          </a:ln>
+        </p:spPr>
+        <p:style>
+          <a:lnRef idx="2">
+            <a:schemeClr val="accent1">
+              <a:shade val="15000"/>
+            </a:schemeClr>
+          </a:lnRef>
+          <a:fillRef idx="1">
+            <a:schemeClr val="accent1"/>
+          </a:fillRef>
+          <a:effectRef idx="0">
+            <a:schemeClr val="accent1"/>
+          </a:effectRef>
+          <a:fontRef idx="minor">
+            <a:schemeClr val="lt1"/>
+          </a:fontRef>
+        </p:style>
+        <p:txBody>
+          <a:bodyPr rtlCol="0" anchor="ctr"/>
+          <a:lstStyle/>
+          <a:p>
+            <a:pPr algn="ctr"/>
+            <a:r>
+              <a:rPr lang="pt-BR" sz="1200" dirty="0">
+                <a:solidFill>
+                  <a:schemeClr val="tx1"/>
+                </a:solidFill>
+              </a:rPr>
+              <a:t>1</a:t>
+            </a:r>
+          </a:p>
+        </p:txBody>
+      </p:sp>
     </p:spTree>
     <p:extLst>
       <p:ext uri="{BB962C8B-B14F-4D97-AF65-F5344CB8AC3E}">
@@ -6386,436 +6367,8 @@
           </a:p>
         </p:txBody>
       </p:sp>
-      <mc:AlternateContent xmlns:mc="http://schemas.openxmlformats.org/markup-compatibility/2006">
-        <mc:Choice xmlns:a14="http://schemas.microsoft.com/office/drawing/2010/main" Requires="a14">
-          <p:sp>
-            <p:nvSpPr>
-              <p:cNvPr id="3" name="Espaço Reservado para Conteúdo 2">
-                <a:extLst>
-                  <a:ext uri="{FF2B5EF4-FFF2-40B4-BE49-F238E27FC236}">
-                    <a16:creationId xmlns:a16="http://schemas.microsoft.com/office/drawing/2014/main" id="{EC2E1DDA-B549-8F9D-BA64-18BAFB4D49A1}"/>
-                  </a:ext>
-                </a:extLst>
-              </p:cNvPr>
-              <p:cNvSpPr>
-                <a:spLocks noGrp="1"/>
-              </p:cNvSpPr>
-              <p:nvPr>
-                <p:ph idx="1"/>
-              </p:nvPr>
-            </p:nvSpPr>
-            <p:spPr>
-              <a:xfrm>
-                <a:off x="838200" y="2045859"/>
-                <a:ext cx="9791701" cy="4117874"/>
-              </a:xfrm>
-            </p:spPr>
-            <p:txBody>
-              <a:bodyPr>
-                <a:normAutofit/>
-              </a:bodyPr>
-              <a:lstStyle/>
-              <a:p>
-                <a:r>
-                  <a:rPr lang="pt-BR" dirty="0"/>
-                  <a:t>Definição 2</a:t>
-                </a:r>
-              </a:p>
-              <a:p>
-                <a:pPr lvl="1" algn="just"/>
-                <a:endParaRPr lang="pt-BR" dirty="0"/>
-              </a:p>
-              <a:p>
-                <a:pPr lvl="1" algn="just"/>
-                <a:r>
-                  <a:rPr lang="pt-BR" dirty="0"/>
-                  <a:t>Tomamos o valor mínimo das distâncias mínimas entre as amostras no cluster eu e as amostras em outros clusters como a separação entre clusters </a:t>
-                </a:r>
-                <a14:m>
-                  <m:oMath xmlns:m="http://schemas.openxmlformats.org/officeDocument/2006/math">
-                    <m:r>
-                      <a:rPr lang="pt-BR" b="0" i="1" smtClean="0">
-                        <a:latin typeface="Cambria Math" panose="02040503050406030204" pitchFamily="18" charset="0"/>
-                      </a:rPr>
-                      <m:t>𝑠𝑑</m:t>
-                    </m:r>
-                    <m:d>
-                      <m:dPr>
-                        <m:ctrlPr>
-                          <a:rPr lang="pt-BR" b="0" i="1" smtClean="0">
-                            <a:latin typeface="Cambria Math" panose="02040503050406030204" pitchFamily="18" charset="0"/>
-                          </a:rPr>
-                        </m:ctrlPr>
-                      </m:dPr>
-                      <m:e>
-                        <m:r>
-                          <a:rPr lang="pt-BR" b="0" i="1" smtClean="0">
-                            <a:latin typeface="Cambria Math" panose="02040503050406030204" pitchFamily="18" charset="0"/>
-                          </a:rPr>
-                          <m:t>𝑖</m:t>
-                        </m:r>
-                      </m:e>
-                    </m:d>
-                  </m:oMath>
-                </a14:m>
-                <a:r>
-                  <a:rPr lang="pt-BR" dirty="0"/>
-                  <a:t>, que é definido da seguinte forma: </a:t>
-                </a:r>
-              </a:p>
-            </p:txBody>
-          </p:sp>
-        </mc:Choice>
-        <mc:Fallback>
-          <p:sp>
-            <p:nvSpPr>
-              <p:cNvPr id="3" name="Espaço Reservado para Conteúdo 2">
-                <a:extLst>
-                  <a:ext uri="{FF2B5EF4-FFF2-40B4-BE49-F238E27FC236}">
-                    <a16:creationId xmlns:a16="http://schemas.microsoft.com/office/drawing/2014/main" id="{EC2E1DDA-B549-8F9D-BA64-18BAFB4D49A1}"/>
-                  </a:ext>
-                </a:extLst>
-              </p:cNvPr>
-              <p:cNvSpPr>
-                <a:spLocks noGrp="1" noRot="1" noChangeAspect="1" noMove="1" noResize="1" noEditPoints="1" noAdjustHandles="1" noChangeArrowheads="1" noChangeShapeType="1" noTextEdit="1"/>
-              </p:cNvSpPr>
-              <p:nvPr>
-                <p:ph idx="1"/>
-              </p:nvPr>
-            </p:nvSpPr>
-            <p:spPr>
-              <a:xfrm>
-                <a:off x="838200" y="2045859"/>
-                <a:ext cx="9791701" cy="4117874"/>
-              </a:xfrm>
-              <a:blipFill>
-                <a:blip r:embed="rId3"/>
-                <a:stretch>
-                  <a:fillRect l="-1121" t="-2519" r="-934"/>
-                </a:stretch>
-              </a:blipFill>
-            </p:spPr>
-            <p:txBody>
-              <a:bodyPr/>
-              <a:lstStyle/>
-              <a:p>
-                <a:r>
-                  <a:rPr lang="pt-BR">
-                    <a:noFill/>
-                  </a:rPr>
-                  <a:t> </a:t>
-                </a:r>
-              </a:p>
-            </p:txBody>
-          </p:sp>
-        </mc:Fallback>
-      </mc:AlternateContent>
-      <p:pic>
-        <p:nvPicPr>
-          <p:cNvPr id="4" name="Picture 2" descr="Local do Evento | SBRC 2021 - Simpósio Brasileiro de Redes ...">
-            <a:extLst>
-              <a:ext uri="{FF2B5EF4-FFF2-40B4-BE49-F238E27FC236}">
-                <a16:creationId xmlns:a16="http://schemas.microsoft.com/office/drawing/2014/main" id="{C4BAF076-983A-267F-65B0-779489FA3886}"/>
-              </a:ext>
-            </a:extLst>
-          </p:cNvPr>
-          <p:cNvPicPr>
-            <a:picLocks noChangeAspect="1" noChangeArrowheads="1"/>
-          </p:cNvPicPr>
-          <p:nvPr/>
-        </p:nvPicPr>
-        <p:blipFill>
-          <a:blip r:embed="rId4">
-            <a:extLst>
-              <a:ext uri="{28A0092B-C50C-407E-A947-70E740481C1C}">
-                <a14:useLocalDpi xmlns:a14="http://schemas.microsoft.com/office/drawing/2010/main" val="0"/>
-              </a:ext>
-            </a:extLst>
-          </a:blip>
-          <a:srcRect/>
-          <a:stretch>
-            <a:fillRect/>
-          </a:stretch>
-        </p:blipFill>
-        <p:spPr bwMode="auto">
-          <a:xfrm>
-            <a:off x="8783783" y="0"/>
-            <a:ext cx="3408217" cy="1388533"/>
-          </a:xfrm>
-          <a:prstGeom prst="rect">
-            <a:avLst/>
-          </a:prstGeom>
-          <a:noFill/>
-          <a:extLst>
-            <a:ext uri="{909E8E84-426E-40DD-AFC4-6F175D3DCCD1}">
-              <a14:hiddenFill xmlns:a14="http://schemas.microsoft.com/office/drawing/2010/main">
-                <a:solidFill>
-                  <a:srgbClr val="FFFFFF"/>
-                </a:solidFill>
-              </a14:hiddenFill>
-            </a:ext>
-          </a:extLst>
-        </p:spPr>
-      </p:pic>
-      <p:pic>
-        <p:nvPicPr>
-          <p:cNvPr id="5" name="Picture 4" descr="Edições Anteriores | SBRC 2021 - Simpósio Brasileiro de Redes de  Computadores e Sistemas Distribuídos">
-            <a:extLst>
-              <a:ext uri="{FF2B5EF4-FFF2-40B4-BE49-F238E27FC236}">
-                <a16:creationId xmlns:a16="http://schemas.microsoft.com/office/drawing/2014/main" id="{EE629CB4-DE61-E1C8-0777-7BFAD2ACB3C1}"/>
-              </a:ext>
-            </a:extLst>
-          </p:cNvPr>
-          <p:cNvPicPr>
-            <a:picLocks noChangeAspect="1" noChangeArrowheads="1"/>
-          </p:cNvPicPr>
-          <p:nvPr/>
-        </p:nvPicPr>
-        <p:blipFill rotWithShape="1">
-          <a:blip r:embed="rId5">
-            <a:extLst>
-              <a:ext uri="{28A0092B-C50C-407E-A947-70E740481C1C}">
-                <a14:useLocalDpi xmlns:a14="http://schemas.microsoft.com/office/drawing/2010/main" val="0"/>
-              </a:ext>
-            </a:extLst>
-          </a:blip>
-          <a:srcRect l="18938" t="24085"/>
-          <a:stretch/>
-        </p:blipFill>
-        <p:spPr bwMode="auto">
-          <a:xfrm>
-            <a:off x="259976" y="5803900"/>
-            <a:ext cx="2762759" cy="1054100"/>
-          </a:xfrm>
-          <a:prstGeom prst="rect">
-            <a:avLst/>
-          </a:prstGeom>
-          <a:noFill/>
-          <a:extLst>
-            <a:ext uri="{909E8E84-426E-40DD-AFC4-6F175D3DCCD1}">
-              <a14:hiddenFill xmlns:a14="http://schemas.microsoft.com/office/drawing/2010/main">
-                <a:solidFill>
-                  <a:srgbClr val="FFFFFF"/>
-                </a:solidFill>
-              </a14:hiddenFill>
-            </a:ext>
-          </a:extLst>
-        </p:spPr>
-      </p:pic>
-      <p:pic>
-        <p:nvPicPr>
-          <p:cNvPr id="9" name="Imagem 8">
-            <a:extLst>
-              <a:ext uri="{FF2B5EF4-FFF2-40B4-BE49-F238E27FC236}">
-                <a16:creationId xmlns:a16="http://schemas.microsoft.com/office/drawing/2014/main" id="{BC4368CE-25D6-7CA9-559D-8C6222DF2902}"/>
-              </a:ext>
-            </a:extLst>
-          </p:cNvPr>
-          <p:cNvPicPr>
-            <a:picLocks noChangeAspect="1"/>
-          </p:cNvPicPr>
-          <p:nvPr/>
-        </p:nvPicPr>
-        <p:blipFill>
-          <a:blip r:embed="rId6"/>
-          <a:stretch>
-            <a:fillRect/>
-          </a:stretch>
-        </p:blipFill>
-        <p:spPr>
-          <a:xfrm>
-            <a:off x="2961466" y="4319006"/>
-            <a:ext cx="6269068" cy="647436"/>
-          </a:xfrm>
-          <a:prstGeom prst="rect">
-            <a:avLst/>
-          </a:prstGeom>
-        </p:spPr>
-      </p:pic>
-      <p:sp>
-        <p:nvSpPr>
-          <p:cNvPr id="10" name="Retângulo 9">
-            <a:extLst>
-              <a:ext uri="{FF2B5EF4-FFF2-40B4-BE49-F238E27FC236}">
-                <a16:creationId xmlns:a16="http://schemas.microsoft.com/office/drawing/2014/main" id="{3113CB22-0BA8-C475-00B6-863A69FDABF0}"/>
-              </a:ext>
-            </a:extLst>
-          </p:cNvPr>
-          <p:cNvSpPr/>
-          <p:nvPr/>
-        </p:nvSpPr>
-        <p:spPr>
-          <a:xfrm>
-            <a:off x="4613088" y="5242183"/>
-            <a:ext cx="2965824" cy="1340279"/>
-          </a:xfrm>
-          <a:prstGeom prst="rect">
-            <a:avLst/>
-          </a:prstGeom>
-          <a:solidFill>
-            <a:schemeClr val="bg1"/>
-          </a:solidFill>
-        </p:spPr>
-        <p:style>
-          <a:lnRef idx="2">
-            <a:schemeClr val="accent1">
-              <a:shade val="15000"/>
-            </a:schemeClr>
-          </a:lnRef>
-          <a:fillRef idx="1">
-            <a:schemeClr val="accent1"/>
-          </a:fillRef>
-          <a:effectRef idx="0">
-            <a:schemeClr val="accent1"/>
-          </a:effectRef>
-          <a:fontRef idx="minor">
-            <a:schemeClr val="lt1"/>
-          </a:fontRef>
-        </p:style>
-        <p:txBody>
-          <a:bodyPr rtlCol="0" anchor="ctr"/>
-          <a:lstStyle/>
-          <a:p>
-            <a:pPr algn="just"/>
-            <a:r>
-              <a:rPr lang="pt-BR" sz="1800" dirty="0">
-                <a:solidFill>
-                  <a:schemeClr val="tx1"/>
-                </a:solidFill>
-              </a:rPr>
-              <a:t>Onde </a:t>
-            </a:r>
-            <a:r>
-              <a:rPr lang="pt-BR" sz="1800" dirty="0" err="1">
-                <a:solidFill>
-                  <a:schemeClr val="tx1"/>
-                </a:solidFill>
-              </a:rPr>
-              <a:t>dist</a:t>
-            </a:r>
-            <a:r>
-              <a:rPr lang="pt-BR" sz="1800" dirty="0">
-                <a:solidFill>
-                  <a:schemeClr val="tx1"/>
-                </a:solidFill>
-              </a:rPr>
-              <a:t>(</a:t>
-            </a:r>
-            <a:r>
-              <a:rPr lang="pt-BR" sz="1800" dirty="0" err="1">
-                <a:solidFill>
-                  <a:schemeClr val="tx1"/>
-                </a:solidFill>
-              </a:rPr>
-              <a:t>xi,xj</a:t>
-            </a:r>
-            <a:r>
-              <a:rPr lang="pt-BR" sz="1800" dirty="0">
-                <a:solidFill>
-                  <a:schemeClr val="tx1"/>
-                </a:solidFill>
-              </a:rPr>
-              <a:t>) é a distância euclidiana </a:t>
-            </a:r>
-            <a:r>
-              <a:rPr lang="pt-BR" sz="1800" dirty="0" err="1">
-                <a:solidFill>
-                  <a:schemeClr val="tx1"/>
-                </a:solidFill>
-              </a:rPr>
-              <a:t>intercluster</a:t>
-            </a:r>
-            <a:r>
-              <a:rPr lang="pt-BR" sz="1800" dirty="0">
-                <a:solidFill>
-                  <a:schemeClr val="tx1"/>
-                </a:solidFill>
-              </a:rPr>
-              <a:t> das amostras xi e </a:t>
-            </a:r>
-            <a:r>
-              <a:rPr lang="pt-BR" sz="1800" dirty="0" err="1">
-                <a:solidFill>
-                  <a:schemeClr val="tx1"/>
-                </a:solidFill>
-              </a:rPr>
-              <a:t>xj</a:t>
-            </a:r>
-            <a:endParaRPr lang="pt-BR" sz="1800" dirty="0">
-              <a:solidFill>
-                <a:schemeClr val="tx1"/>
-              </a:solidFill>
-            </a:endParaRPr>
-          </a:p>
-        </p:txBody>
-      </p:sp>
-    </p:spTree>
-    <p:extLst>
-      <p:ext uri="{BB962C8B-B14F-4D97-AF65-F5344CB8AC3E}">
-        <p14:creationId xmlns:p14="http://schemas.microsoft.com/office/powerpoint/2010/main" val="3192409845"/>
-      </p:ext>
-    </p:extLst>
-  </p:cSld>
-  <p:clrMapOvr>
-    <a:masterClrMapping/>
-  </p:clrMapOvr>
-</p:sld>
-</file>
-
-<file path=ppt/slides/slide11.xml><?xml version="1.0" encoding="utf-8"?>
-<p:sld xmlns:a="http://schemas.openxmlformats.org/drawingml/2006/main" xmlns:r="http://schemas.openxmlformats.org/officeDocument/2006/relationships" xmlns:p="http://schemas.openxmlformats.org/presentationml/2006/main">
-  <p:cSld>
-    <p:spTree>
-      <p:nvGrpSpPr>
-        <p:cNvPr id="1" name=""/>
-        <p:cNvGrpSpPr/>
-        <p:nvPr/>
-      </p:nvGrpSpPr>
-      <p:grpSpPr>
-        <a:xfrm>
-          <a:off x="0" y="0"/>
-          <a:ext cx="0" cy="0"/>
-          <a:chOff x="0" y="0"/>
-          <a:chExt cx="0" cy="0"/>
-        </a:xfrm>
-      </p:grpSpPr>
-      <p:sp>
-        <p:nvSpPr>
-          <p:cNvPr id="2" name="Título 1">
-            <a:extLst>
-              <a:ext uri="{FF2B5EF4-FFF2-40B4-BE49-F238E27FC236}">
-                <a16:creationId xmlns:a16="http://schemas.microsoft.com/office/drawing/2014/main" id="{4549A9CF-9A04-0D0B-3F38-47569BAC879F}"/>
-              </a:ext>
-            </a:extLst>
-          </p:cNvPr>
-          <p:cNvSpPr>
-            <a:spLocks noGrp="1"/>
-          </p:cNvSpPr>
-          <p:nvPr>
-            <p:ph type="title"/>
-          </p:nvPr>
-        </p:nvSpPr>
-        <p:spPr/>
-        <p:txBody>
-          <a:bodyPr/>
-          <a:lstStyle/>
-          <a:p>
-            <a:r>
-              <a:rPr lang="pt-BR" dirty="0"/>
-              <a:t>Índice de proporção de</a:t>
-            </a:r>
-            <a:br>
-              <a:rPr lang="pt-BR" dirty="0"/>
-            </a:br>
-            <a:r>
-              <a:rPr lang="pt-BR" dirty="0"/>
-              <a:t>compacidade separada (CSP)</a:t>
-            </a:r>
-          </a:p>
-        </p:txBody>
-      </p:sp>
-      <mc:AlternateContent xmlns:mc="http://schemas.openxmlformats.org/markup-compatibility/2006">
-        <mc:Choice xmlns:a14="http://schemas.microsoft.com/office/drawing/2010/main" Requires="a14">
+      <mc:AlternateContent xmlns:mc="http://schemas.openxmlformats.org/markup-compatibility/2006" xmlns:a14="http://schemas.microsoft.com/office/drawing/2010/main">
+        <mc:Choice Requires="a14">
           <p:sp>
             <p:nvSpPr>
               <p:cNvPr id="3" name="Espaço Reservado para Conteúdo 2">
@@ -6910,7 +6463,7 @@
             </p:txBody>
           </p:sp>
         </mc:Choice>
-        <mc:Fallback>
+        <mc:Fallback xmlns="">
           <p:sp>
             <p:nvSpPr>
               <p:cNvPr id="3" name="Espaço Reservado para Conteúdo 2">
@@ -7104,6 +6657,67 @@
           </a:prstGeom>
         </p:spPr>
       </p:pic>
+      <p:sp>
+        <p:nvSpPr>
+          <p:cNvPr id="6" name="Retângulo 5">
+            <a:extLst>
+              <a:ext uri="{FF2B5EF4-FFF2-40B4-BE49-F238E27FC236}">
+                <a16:creationId xmlns:a16="http://schemas.microsoft.com/office/drawing/2014/main" id="{F00685E5-F8A1-64B9-FFB0-3D5A7BE8693D}"/>
+              </a:ext>
+            </a:extLst>
+          </p:cNvPr>
+          <p:cNvSpPr/>
+          <p:nvPr/>
+        </p:nvSpPr>
+        <p:spPr>
+          <a:xfrm>
+            <a:off x="11712388" y="6349004"/>
+            <a:ext cx="439271" cy="480110"/>
+          </a:xfrm>
+          <a:prstGeom prst="rect">
+            <a:avLst/>
+          </a:prstGeom>
+          <a:solidFill>
+            <a:schemeClr val="bg1"/>
+          </a:solidFill>
+          <a:ln>
+            <a:solidFill>
+              <a:schemeClr val="bg1"/>
+            </a:solidFill>
+          </a:ln>
+        </p:spPr>
+        <p:style>
+          <a:lnRef idx="2">
+            <a:schemeClr val="accent1">
+              <a:shade val="15000"/>
+            </a:schemeClr>
+          </a:lnRef>
+          <a:fillRef idx="1">
+            <a:schemeClr val="accent1"/>
+          </a:fillRef>
+          <a:effectRef idx="0">
+            <a:schemeClr val="accent1"/>
+          </a:effectRef>
+          <a:fontRef idx="minor">
+            <a:schemeClr val="lt1"/>
+          </a:fontRef>
+        </p:style>
+        <p:txBody>
+          <a:bodyPr rtlCol="0" anchor="ctr"/>
+          <a:lstStyle/>
+          <a:p>
+            <a:pPr algn="ctr"/>
+            <a:r>
+              <a:rPr lang="pt-BR" sz="1200" dirty="0">
+                <a:solidFill>
+                  <a:schemeClr val="tx1"/>
+                </a:solidFill>
+              </a:rPr>
+              <a:t>11</a:t>
+            </a:r>
+          </a:p>
+        </p:txBody>
+      </p:sp>
     </p:spTree>
     <p:extLst>
       <p:ext uri="{BB962C8B-B14F-4D97-AF65-F5344CB8AC3E}">
@@ -7117,7 +6731,7 @@
 </p:sld>
 </file>
 
-<file path=ppt/slides/slide12.xml><?xml version="1.0" encoding="utf-8"?>
+<file path=ppt/slides/slide11.xml><?xml version="1.0" encoding="utf-8"?>
 <p:sld xmlns:a="http://schemas.openxmlformats.org/drawingml/2006/main" xmlns:r="http://schemas.openxmlformats.org/officeDocument/2006/relationships" xmlns:p="http://schemas.openxmlformats.org/presentationml/2006/main">
   <p:cSld>
     <p:spTree>
@@ -7169,8 +6783,8 @@
           </a:p>
         </p:txBody>
       </p:sp>
-      <mc:AlternateContent xmlns:mc="http://schemas.openxmlformats.org/markup-compatibility/2006">
-        <mc:Choice xmlns:a14="http://schemas.microsoft.com/office/drawing/2010/main" Requires="a14">
+      <mc:AlternateContent xmlns:mc="http://schemas.openxmlformats.org/markup-compatibility/2006" xmlns:a14="http://schemas.microsoft.com/office/drawing/2010/main">
+        <mc:Choice Requires="a14">
           <p:sp>
             <p:nvSpPr>
               <p:cNvPr id="3" name="Espaço Reservado para Conteúdo 2">
@@ -7265,7 +6879,7 @@
             </p:txBody>
           </p:sp>
         </mc:Choice>
-        <mc:Fallback>
+        <mc:Fallback xmlns="">
           <p:sp>
             <p:nvSpPr>
               <p:cNvPr id="3" name="Espaço Reservado para Conteúdo 2">
@@ -7459,6 +7073,67 @@
           </a:prstGeom>
         </p:spPr>
       </p:pic>
+      <p:sp>
+        <p:nvSpPr>
+          <p:cNvPr id="6" name="Retângulo 5">
+            <a:extLst>
+              <a:ext uri="{FF2B5EF4-FFF2-40B4-BE49-F238E27FC236}">
+                <a16:creationId xmlns:a16="http://schemas.microsoft.com/office/drawing/2014/main" id="{64772FC2-A63C-7CCA-3DEB-F5427C973F94}"/>
+              </a:ext>
+            </a:extLst>
+          </p:cNvPr>
+          <p:cNvSpPr/>
+          <p:nvPr/>
+        </p:nvSpPr>
+        <p:spPr>
+          <a:xfrm>
+            <a:off x="11712388" y="6349004"/>
+            <a:ext cx="439271" cy="480110"/>
+          </a:xfrm>
+          <a:prstGeom prst="rect">
+            <a:avLst/>
+          </a:prstGeom>
+          <a:solidFill>
+            <a:schemeClr val="bg1"/>
+          </a:solidFill>
+          <a:ln>
+            <a:solidFill>
+              <a:schemeClr val="bg1"/>
+            </a:solidFill>
+          </a:ln>
+        </p:spPr>
+        <p:style>
+          <a:lnRef idx="2">
+            <a:schemeClr val="accent1">
+              <a:shade val="15000"/>
+            </a:schemeClr>
+          </a:lnRef>
+          <a:fillRef idx="1">
+            <a:schemeClr val="accent1"/>
+          </a:fillRef>
+          <a:effectRef idx="0">
+            <a:schemeClr val="accent1"/>
+          </a:effectRef>
+          <a:fontRef idx="minor">
+            <a:schemeClr val="lt1"/>
+          </a:fontRef>
+        </p:style>
+        <p:txBody>
+          <a:bodyPr rtlCol="0" anchor="ctr"/>
+          <a:lstStyle/>
+          <a:p>
+            <a:pPr algn="ctr"/>
+            <a:r>
+              <a:rPr lang="pt-BR" sz="1200" dirty="0">
+                <a:solidFill>
+                  <a:schemeClr val="tx1"/>
+                </a:solidFill>
+              </a:rPr>
+              <a:t>12</a:t>
+            </a:r>
+          </a:p>
+        </p:txBody>
+      </p:sp>
     </p:spTree>
     <p:extLst>
       <p:ext uri="{BB962C8B-B14F-4D97-AF65-F5344CB8AC3E}">
@@ -7472,7 +7147,7 @@
 </p:sld>
 </file>
 
-<file path=ppt/slides/slide13.xml><?xml version="1.0" encoding="utf-8"?>
+<file path=ppt/slides/slide12.xml><?xml version="1.0" encoding="utf-8"?>
 <p:sld xmlns:a="http://schemas.openxmlformats.org/drawingml/2006/main" xmlns:r="http://schemas.openxmlformats.org/officeDocument/2006/relationships" xmlns:p="http://schemas.openxmlformats.org/presentationml/2006/main">
   <p:cSld>
     <p:spTree>
@@ -7524,8 +7199,8 @@
           </a:p>
         </p:txBody>
       </p:sp>
-      <mc:AlternateContent xmlns:mc="http://schemas.openxmlformats.org/markup-compatibility/2006">
-        <mc:Choice xmlns:a14="http://schemas.microsoft.com/office/drawing/2010/main" Requires="a14">
+      <mc:AlternateContent xmlns:mc="http://schemas.openxmlformats.org/markup-compatibility/2006" xmlns:a14="http://schemas.microsoft.com/office/drawing/2010/main">
+        <mc:Choice Requires="a14">
           <p:sp>
             <p:nvSpPr>
               <p:cNvPr id="3" name="Espaço Reservado para Conteúdo 2">
@@ -7606,7 +7281,7 @@
             </p:txBody>
           </p:sp>
         </mc:Choice>
-        <mc:Fallback>
+        <mc:Fallback xmlns="">
           <p:sp>
             <p:nvSpPr>
               <p:cNvPr id="3" name="Espaço Reservado para Conteúdo 2">
@@ -7832,6 +7507,67 @@
           </a:prstGeom>
         </p:spPr>
       </p:pic>
+      <p:sp>
+        <p:nvSpPr>
+          <p:cNvPr id="6" name="Retângulo 5">
+            <a:extLst>
+              <a:ext uri="{FF2B5EF4-FFF2-40B4-BE49-F238E27FC236}">
+                <a16:creationId xmlns:a16="http://schemas.microsoft.com/office/drawing/2014/main" id="{F2301FF9-7014-A306-D0E6-F67DC752143C}"/>
+              </a:ext>
+            </a:extLst>
+          </p:cNvPr>
+          <p:cNvSpPr/>
+          <p:nvPr/>
+        </p:nvSpPr>
+        <p:spPr>
+          <a:xfrm>
+            <a:off x="11712388" y="6349004"/>
+            <a:ext cx="439271" cy="480110"/>
+          </a:xfrm>
+          <a:prstGeom prst="rect">
+            <a:avLst/>
+          </a:prstGeom>
+          <a:solidFill>
+            <a:schemeClr val="bg1"/>
+          </a:solidFill>
+          <a:ln>
+            <a:solidFill>
+              <a:schemeClr val="bg1"/>
+            </a:solidFill>
+          </a:ln>
+        </p:spPr>
+        <p:style>
+          <a:lnRef idx="2">
+            <a:schemeClr val="accent1">
+              <a:shade val="15000"/>
+            </a:schemeClr>
+          </a:lnRef>
+          <a:fillRef idx="1">
+            <a:schemeClr val="accent1"/>
+          </a:fillRef>
+          <a:effectRef idx="0">
+            <a:schemeClr val="accent1"/>
+          </a:effectRef>
+          <a:fontRef idx="minor">
+            <a:schemeClr val="lt1"/>
+          </a:fontRef>
+        </p:style>
+        <p:txBody>
+          <a:bodyPr rtlCol="0" anchor="ctr"/>
+          <a:lstStyle/>
+          <a:p>
+            <a:pPr algn="ctr"/>
+            <a:r>
+              <a:rPr lang="pt-BR" sz="1200" dirty="0">
+                <a:solidFill>
+                  <a:schemeClr val="tx1"/>
+                </a:solidFill>
+              </a:rPr>
+              <a:t>13</a:t>
+            </a:r>
+          </a:p>
+        </p:txBody>
+      </p:sp>
     </p:spTree>
     <p:extLst>
       <p:ext uri="{BB962C8B-B14F-4D97-AF65-F5344CB8AC3E}">
@@ -7845,7 +7581,7 @@
 </p:sld>
 </file>
 
-<file path=ppt/slides/slide14.xml><?xml version="1.0" encoding="utf-8"?>
+<file path=ppt/slides/slide13.xml><?xml version="1.0" encoding="utf-8"?>
 <p:sld xmlns:a="http://schemas.openxmlformats.org/drawingml/2006/main" xmlns:r="http://schemas.openxmlformats.org/officeDocument/2006/relationships" xmlns:p="http://schemas.openxmlformats.org/presentationml/2006/main">
   <p:cSld>
     <p:spTree>
@@ -8126,6 +7862,67 @@
           </a:prstGeom>
         </p:spPr>
       </p:pic>
+      <p:sp>
+        <p:nvSpPr>
+          <p:cNvPr id="7" name="Retângulo 6">
+            <a:extLst>
+              <a:ext uri="{FF2B5EF4-FFF2-40B4-BE49-F238E27FC236}">
+                <a16:creationId xmlns:a16="http://schemas.microsoft.com/office/drawing/2014/main" id="{72FB5326-CF32-75F7-7785-54C06C03FAD3}"/>
+              </a:ext>
+            </a:extLst>
+          </p:cNvPr>
+          <p:cNvSpPr/>
+          <p:nvPr/>
+        </p:nvSpPr>
+        <p:spPr>
+          <a:xfrm>
+            <a:off x="11712388" y="6349004"/>
+            <a:ext cx="439271" cy="480110"/>
+          </a:xfrm>
+          <a:prstGeom prst="rect">
+            <a:avLst/>
+          </a:prstGeom>
+          <a:solidFill>
+            <a:schemeClr val="bg1"/>
+          </a:solidFill>
+          <a:ln>
+            <a:solidFill>
+              <a:schemeClr val="bg1"/>
+            </a:solidFill>
+          </a:ln>
+        </p:spPr>
+        <p:style>
+          <a:lnRef idx="2">
+            <a:schemeClr val="accent1">
+              <a:shade val="15000"/>
+            </a:schemeClr>
+          </a:lnRef>
+          <a:fillRef idx="1">
+            <a:schemeClr val="accent1"/>
+          </a:fillRef>
+          <a:effectRef idx="0">
+            <a:schemeClr val="accent1"/>
+          </a:effectRef>
+          <a:fontRef idx="minor">
+            <a:schemeClr val="lt1"/>
+          </a:fontRef>
+        </p:style>
+        <p:txBody>
+          <a:bodyPr rtlCol="0" anchor="ctr"/>
+          <a:lstStyle/>
+          <a:p>
+            <a:pPr algn="ctr"/>
+            <a:r>
+              <a:rPr lang="pt-BR" sz="1200" dirty="0">
+                <a:solidFill>
+                  <a:schemeClr val="tx1"/>
+                </a:solidFill>
+              </a:rPr>
+              <a:t>14</a:t>
+            </a:r>
+          </a:p>
+        </p:txBody>
+      </p:sp>
     </p:spTree>
     <p:extLst>
       <p:ext uri="{BB962C8B-B14F-4D97-AF65-F5344CB8AC3E}">
@@ -8139,7 +7936,7 @@
 </p:sld>
 </file>
 
-<file path=ppt/slides/slide15.xml><?xml version="1.0" encoding="utf-8"?>
+<file path=ppt/slides/slide14.xml><?xml version="1.0" encoding="utf-8"?>
 <p:sld xmlns:a="http://schemas.openxmlformats.org/drawingml/2006/main" xmlns:r="http://schemas.openxmlformats.org/officeDocument/2006/relationships" xmlns:p="http://schemas.openxmlformats.org/presentationml/2006/main">
   <p:cSld>
     <p:spTree>
@@ -8191,8 +7988,8 @@
           </a:p>
         </p:txBody>
       </p:sp>
-      <mc:AlternateContent xmlns:mc="http://schemas.openxmlformats.org/markup-compatibility/2006">
-        <mc:Choice xmlns:a14="http://schemas.microsoft.com/office/drawing/2010/main" Requires="a14">
+      <mc:AlternateContent xmlns:mc="http://schemas.openxmlformats.org/markup-compatibility/2006" xmlns:a14="http://schemas.microsoft.com/office/drawing/2010/main">
+        <mc:Choice Requires="a14">
           <p:sp>
             <p:nvSpPr>
               <p:cNvPr id="3" name="Espaço Reservado para Conteúdo 2">
@@ -8528,7 +8325,7 @@
             </p:txBody>
           </p:sp>
         </mc:Choice>
-        <mc:Fallback>
+        <mc:Fallback xmlns="">
           <p:sp>
             <p:nvSpPr>
               <p:cNvPr id="3" name="Espaço Reservado para Conteúdo 2">
@@ -8649,6 +8446,67 @@
           </a:prstGeom>
         </p:spPr>
       </p:pic>
+      <p:sp>
+        <p:nvSpPr>
+          <p:cNvPr id="5" name="Retângulo 4">
+            <a:extLst>
+              <a:ext uri="{FF2B5EF4-FFF2-40B4-BE49-F238E27FC236}">
+                <a16:creationId xmlns:a16="http://schemas.microsoft.com/office/drawing/2014/main" id="{3DDE06A7-00A6-0904-0103-BA064D7EEBD8}"/>
+              </a:ext>
+            </a:extLst>
+          </p:cNvPr>
+          <p:cNvSpPr/>
+          <p:nvPr/>
+        </p:nvSpPr>
+        <p:spPr>
+          <a:xfrm>
+            <a:off x="11712388" y="6349004"/>
+            <a:ext cx="439271" cy="480110"/>
+          </a:xfrm>
+          <a:prstGeom prst="rect">
+            <a:avLst/>
+          </a:prstGeom>
+          <a:solidFill>
+            <a:schemeClr val="bg1"/>
+          </a:solidFill>
+          <a:ln>
+            <a:solidFill>
+              <a:schemeClr val="bg1"/>
+            </a:solidFill>
+          </a:ln>
+        </p:spPr>
+        <p:style>
+          <a:lnRef idx="2">
+            <a:schemeClr val="accent1">
+              <a:shade val="15000"/>
+            </a:schemeClr>
+          </a:lnRef>
+          <a:fillRef idx="1">
+            <a:schemeClr val="accent1"/>
+          </a:fillRef>
+          <a:effectRef idx="0">
+            <a:schemeClr val="accent1"/>
+          </a:effectRef>
+          <a:fontRef idx="minor">
+            <a:schemeClr val="lt1"/>
+          </a:fontRef>
+        </p:style>
+        <p:txBody>
+          <a:bodyPr rtlCol="0" anchor="ctr"/>
+          <a:lstStyle/>
+          <a:p>
+            <a:pPr algn="ctr"/>
+            <a:r>
+              <a:rPr lang="pt-BR" sz="1200" dirty="0">
+                <a:solidFill>
+                  <a:schemeClr val="tx1"/>
+                </a:solidFill>
+              </a:rPr>
+              <a:t>15</a:t>
+            </a:r>
+          </a:p>
+        </p:txBody>
+      </p:sp>
     </p:spTree>
     <p:extLst>
       <p:ext uri="{BB962C8B-B14F-4D97-AF65-F5344CB8AC3E}">
@@ -8662,7 +8520,7 @@
 </p:sld>
 </file>
 
-<file path=ppt/slides/slide16.xml><?xml version="1.0" encoding="utf-8"?>
+<file path=ppt/slides/slide15.xml><?xml version="1.0" encoding="utf-8"?>
 <p:sld xmlns:a="http://schemas.openxmlformats.org/drawingml/2006/main" xmlns:r="http://schemas.openxmlformats.org/officeDocument/2006/relationships" xmlns:p="http://schemas.openxmlformats.org/presentationml/2006/main">
   <p:cSld>
     <p:spTree>
@@ -8711,8 +8569,8 @@
           </a:p>
         </p:txBody>
       </p:sp>
-      <mc:AlternateContent xmlns:mc="http://schemas.openxmlformats.org/markup-compatibility/2006">
-        <mc:Choice xmlns:a14="http://schemas.microsoft.com/office/drawing/2010/main" Requires="a14">
+      <mc:AlternateContent xmlns:mc="http://schemas.openxmlformats.org/markup-compatibility/2006" xmlns:a14="http://schemas.microsoft.com/office/drawing/2010/main">
+        <mc:Choice Requires="a14">
           <p:sp>
             <p:nvSpPr>
               <p:cNvPr id="3" name="Espaço Reservado para Conteúdo 2">
@@ -8917,7 +8775,7 @@
             </p:txBody>
           </p:sp>
         </mc:Choice>
-        <mc:Fallback>
+        <mc:Fallback xmlns="">
           <p:sp>
             <p:nvSpPr>
               <p:cNvPr id="3" name="Espaço Reservado para Conteúdo 2">
@@ -9082,6 +8940,67 @@
           </a:prstGeom>
         </p:spPr>
       </p:pic>
+      <p:sp>
+        <p:nvSpPr>
+          <p:cNvPr id="6" name="Retângulo 5">
+            <a:extLst>
+              <a:ext uri="{FF2B5EF4-FFF2-40B4-BE49-F238E27FC236}">
+                <a16:creationId xmlns:a16="http://schemas.microsoft.com/office/drawing/2014/main" id="{919120DC-DB52-3C52-BD3B-DA225B83BA14}"/>
+              </a:ext>
+            </a:extLst>
+          </p:cNvPr>
+          <p:cNvSpPr/>
+          <p:nvPr/>
+        </p:nvSpPr>
+        <p:spPr>
+          <a:xfrm>
+            <a:off x="11712388" y="6349004"/>
+            <a:ext cx="439271" cy="480110"/>
+          </a:xfrm>
+          <a:prstGeom prst="rect">
+            <a:avLst/>
+          </a:prstGeom>
+          <a:solidFill>
+            <a:schemeClr val="bg1"/>
+          </a:solidFill>
+          <a:ln>
+            <a:solidFill>
+              <a:schemeClr val="bg1"/>
+            </a:solidFill>
+          </a:ln>
+        </p:spPr>
+        <p:style>
+          <a:lnRef idx="2">
+            <a:schemeClr val="accent1">
+              <a:shade val="15000"/>
+            </a:schemeClr>
+          </a:lnRef>
+          <a:fillRef idx="1">
+            <a:schemeClr val="accent1"/>
+          </a:fillRef>
+          <a:effectRef idx="0">
+            <a:schemeClr val="accent1"/>
+          </a:effectRef>
+          <a:fontRef idx="minor">
+            <a:schemeClr val="lt1"/>
+          </a:fontRef>
+        </p:style>
+        <p:txBody>
+          <a:bodyPr rtlCol="0" anchor="ctr"/>
+          <a:lstStyle/>
+          <a:p>
+            <a:pPr algn="ctr"/>
+            <a:r>
+              <a:rPr lang="pt-BR" sz="1200" dirty="0">
+                <a:solidFill>
+                  <a:schemeClr val="tx1"/>
+                </a:solidFill>
+              </a:rPr>
+              <a:t>16</a:t>
+            </a:r>
+          </a:p>
+        </p:txBody>
+      </p:sp>
     </p:spTree>
     <p:extLst>
       <p:ext uri="{BB962C8B-B14F-4D97-AF65-F5344CB8AC3E}">
@@ -9095,7 +9014,7 @@
 </p:sld>
 </file>
 
-<file path=ppt/slides/slide17.xml><?xml version="1.0" encoding="utf-8"?>
+<file path=ppt/slides/slide16.xml><?xml version="1.0" encoding="utf-8"?>
 <p:sld xmlns:a="http://schemas.openxmlformats.org/drawingml/2006/main" xmlns:r="http://schemas.openxmlformats.org/officeDocument/2006/relationships" xmlns:p="http://schemas.openxmlformats.org/presentationml/2006/main">
   <p:cSld>
     <p:spTree>
@@ -9307,6 +9226,67 @@
           </a:extLst>
         </p:spPr>
       </p:pic>
+      <p:sp>
+        <p:nvSpPr>
+          <p:cNvPr id="6" name="Retângulo 5">
+            <a:extLst>
+              <a:ext uri="{FF2B5EF4-FFF2-40B4-BE49-F238E27FC236}">
+                <a16:creationId xmlns:a16="http://schemas.microsoft.com/office/drawing/2014/main" id="{B7B580AC-5340-1CF0-3500-961F9525B8FD}"/>
+              </a:ext>
+            </a:extLst>
+          </p:cNvPr>
+          <p:cNvSpPr/>
+          <p:nvPr/>
+        </p:nvSpPr>
+        <p:spPr>
+          <a:xfrm>
+            <a:off x="11712388" y="6349004"/>
+            <a:ext cx="439271" cy="480110"/>
+          </a:xfrm>
+          <a:prstGeom prst="rect">
+            <a:avLst/>
+          </a:prstGeom>
+          <a:solidFill>
+            <a:schemeClr val="bg1"/>
+          </a:solidFill>
+          <a:ln>
+            <a:solidFill>
+              <a:schemeClr val="bg1"/>
+            </a:solidFill>
+          </a:ln>
+        </p:spPr>
+        <p:style>
+          <a:lnRef idx="2">
+            <a:schemeClr val="accent1">
+              <a:shade val="15000"/>
+            </a:schemeClr>
+          </a:lnRef>
+          <a:fillRef idx="1">
+            <a:schemeClr val="accent1"/>
+          </a:fillRef>
+          <a:effectRef idx="0">
+            <a:schemeClr val="accent1"/>
+          </a:effectRef>
+          <a:fontRef idx="minor">
+            <a:schemeClr val="lt1"/>
+          </a:fontRef>
+        </p:style>
+        <p:txBody>
+          <a:bodyPr rtlCol="0" anchor="ctr"/>
+          <a:lstStyle/>
+          <a:p>
+            <a:pPr algn="ctr"/>
+            <a:r>
+              <a:rPr lang="pt-BR" sz="1200" dirty="0">
+                <a:solidFill>
+                  <a:schemeClr val="tx1"/>
+                </a:solidFill>
+              </a:rPr>
+              <a:t>17</a:t>
+            </a:r>
+          </a:p>
+        </p:txBody>
+      </p:sp>
     </p:spTree>
     <p:extLst>
       <p:ext uri="{BB962C8B-B14F-4D97-AF65-F5344CB8AC3E}">
@@ -9320,7 +9300,7 @@
 </p:sld>
 </file>
 
-<file path=ppt/slides/slide18.xml><?xml version="1.0" encoding="utf-8"?>
+<file path=ppt/slides/slide17.xml><?xml version="1.0" encoding="utf-8"?>
 <p:sld xmlns:a="http://schemas.openxmlformats.org/drawingml/2006/main" xmlns:r="http://schemas.openxmlformats.org/officeDocument/2006/relationships" xmlns:p="http://schemas.openxmlformats.org/presentationml/2006/main">
   <p:cSld>
     <p:spTree>
@@ -9494,6 +9474,67 @@
           </a:p>
         </p:txBody>
       </p:sp>
+      <p:sp>
+        <p:nvSpPr>
+          <p:cNvPr id="2" name="Retângulo 1">
+            <a:extLst>
+              <a:ext uri="{FF2B5EF4-FFF2-40B4-BE49-F238E27FC236}">
+                <a16:creationId xmlns:a16="http://schemas.microsoft.com/office/drawing/2014/main" id="{17397A53-744F-BE05-3CE6-FD3E8AA92D43}"/>
+              </a:ext>
+            </a:extLst>
+          </p:cNvPr>
+          <p:cNvSpPr/>
+          <p:nvPr/>
+        </p:nvSpPr>
+        <p:spPr>
+          <a:xfrm>
+            <a:off x="11712388" y="6349004"/>
+            <a:ext cx="439271" cy="480110"/>
+          </a:xfrm>
+          <a:prstGeom prst="rect">
+            <a:avLst/>
+          </a:prstGeom>
+          <a:solidFill>
+            <a:schemeClr val="bg1"/>
+          </a:solidFill>
+          <a:ln>
+            <a:solidFill>
+              <a:schemeClr val="bg1"/>
+            </a:solidFill>
+          </a:ln>
+        </p:spPr>
+        <p:style>
+          <a:lnRef idx="2">
+            <a:schemeClr val="accent1">
+              <a:shade val="15000"/>
+            </a:schemeClr>
+          </a:lnRef>
+          <a:fillRef idx="1">
+            <a:schemeClr val="accent1"/>
+          </a:fillRef>
+          <a:effectRef idx="0">
+            <a:schemeClr val="accent1"/>
+          </a:effectRef>
+          <a:fontRef idx="minor">
+            <a:schemeClr val="lt1"/>
+          </a:fontRef>
+        </p:style>
+        <p:txBody>
+          <a:bodyPr rtlCol="0" anchor="ctr"/>
+          <a:lstStyle/>
+          <a:p>
+            <a:pPr algn="ctr"/>
+            <a:r>
+              <a:rPr lang="pt-BR" sz="1200" dirty="0">
+                <a:solidFill>
+                  <a:schemeClr val="tx1"/>
+                </a:solidFill>
+              </a:rPr>
+              <a:t>18</a:t>
+            </a:r>
+          </a:p>
+        </p:txBody>
+      </p:sp>
     </p:spTree>
     <p:extLst>
       <p:ext uri="{BB962C8B-B14F-4D97-AF65-F5344CB8AC3E}">
@@ -9507,7 +9548,7 @@
 </p:sld>
 </file>
 
-<file path=ppt/slides/slide19.xml><?xml version="1.0" encoding="utf-8"?>
+<file path=ppt/slides/slide18.xml><?xml version="1.0" encoding="utf-8"?>
 <p:sld xmlns:a="http://schemas.openxmlformats.org/drawingml/2006/main" xmlns:r="http://schemas.openxmlformats.org/officeDocument/2006/relationships" xmlns:p="http://schemas.openxmlformats.org/presentationml/2006/main">
   <p:cSld>
     <p:spTree>
@@ -9681,8 +9722,8 @@
         </p:blipFill>
         <p:spPr>
           <a:xfrm>
-            <a:off x="5885570" y="1267353"/>
-            <a:ext cx="6306430" cy="5439534"/>
+            <a:off x="5760064" y="1149002"/>
+            <a:ext cx="6195524" cy="5343873"/>
           </a:xfrm>
           <a:prstGeom prst="rect">
             <a:avLst/>
@@ -9734,10 +9775,369 @@
           </a:extLst>
         </p:spPr>
       </p:pic>
+      <p:sp>
+        <p:nvSpPr>
+          <p:cNvPr id="5" name="Retângulo 4">
+            <a:extLst>
+              <a:ext uri="{FF2B5EF4-FFF2-40B4-BE49-F238E27FC236}">
+                <a16:creationId xmlns:a16="http://schemas.microsoft.com/office/drawing/2014/main" id="{028E29C4-34A1-EE0E-2AB7-4A84A28C119F}"/>
+              </a:ext>
+            </a:extLst>
+          </p:cNvPr>
+          <p:cNvSpPr/>
+          <p:nvPr/>
+        </p:nvSpPr>
+        <p:spPr>
+          <a:xfrm>
+            <a:off x="11712388" y="6349004"/>
+            <a:ext cx="439271" cy="480110"/>
+          </a:xfrm>
+          <a:prstGeom prst="rect">
+            <a:avLst/>
+          </a:prstGeom>
+          <a:solidFill>
+            <a:schemeClr val="bg1"/>
+          </a:solidFill>
+          <a:ln>
+            <a:solidFill>
+              <a:schemeClr val="bg1"/>
+            </a:solidFill>
+          </a:ln>
+        </p:spPr>
+        <p:style>
+          <a:lnRef idx="2">
+            <a:schemeClr val="accent1">
+              <a:shade val="15000"/>
+            </a:schemeClr>
+          </a:lnRef>
+          <a:fillRef idx="1">
+            <a:schemeClr val="accent1"/>
+          </a:fillRef>
+          <a:effectRef idx="0">
+            <a:schemeClr val="accent1"/>
+          </a:effectRef>
+          <a:fontRef idx="minor">
+            <a:schemeClr val="lt1"/>
+          </a:fontRef>
+        </p:style>
+        <p:txBody>
+          <a:bodyPr rtlCol="0" anchor="ctr"/>
+          <a:lstStyle/>
+          <a:p>
+            <a:pPr algn="ctr"/>
+            <a:r>
+              <a:rPr lang="pt-BR" sz="1200" dirty="0">
+                <a:solidFill>
+                  <a:schemeClr val="tx1"/>
+                </a:solidFill>
+              </a:rPr>
+              <a:t>19</a:t>
+            </a:r>
+          </a:p>
+        </p:txBody>
+      </p:sp>
     </p:spTree>
     <p:extLst>
       <p:ext uri="{BB962C8B-B14F-4D97-AF65-F5344CB8AC3E}">
         <p14:creationId xmlns:p14="http://schemas.microsoft.com/office/powerpoint/2010/main" val="2236533661"/>
+      </p:ext>
+    </p:extLst>
+  </p:cSld>
+  <p:clrMapOvr>
+    <a:masterClrMapping/>
+  </p:clrMapOvr>
+</p:sld>
+</file>
+
+<file path=ppt/slides/slide19.xml><?xml version="1.0" encoding="utf-8"?>
+<p:sld xmlns:a="http://schemas.openxmlformats.org/drawingml/2006/main" xmlns:r="http://schemas.openxmlformats.org/officeDocument/2006/relationships" xmlns:p="http://schemas.openxmlformats.org/presentationml/2006/main">
+  <p:cSld>
+    <p:spTree>
+      <p:nvGrpSpPr>
+        <p:cNvPr id="1" name=""/>
+        <p:cNvGrpSpPr/>
+        <p:nvPr/>
+      </p:nvGrpSpPr>
+      <p:grpSpPr>
+        <a:xfrm>
+          <a:off x="0" y="0"/>
+          <a:ext cx="0" cy="0"/>
+          <a:chOff x="0" y="0"/>
+          <a:chExt cx="0" cy="0"/>
+        </a:xfrm>
+      </p:grpSpPr>
+      <p:sp>
+        <p:nvSpPr>
+          <p:cNvPr id="2" name="Título 1">
+            <a:extLst>
+              <a:ext uri="{FF2B5EF4-FFF2-40B4-BE49-F238E27FC236}">
+                <a16:creationId xmlns:a16="http://schemas.microsoft.com/office/drawing/2014/main" id="{4549A9CF-9A04-0D0B-3F38-47569BAC879F}"/>
+              </a:ext>
+            </a:extLst>
+          </p:cNvPr>
+          <p:cNvSpPr>
+            <a:spLocks noGrp="1"/>
+          </p:cNvSpPr>
+          <p:nvPr>
+            <p:ph type="title"/>
+          </p:nvPr>
+        </p:nvSpPr>
+        <p:spPr/>
+        <p:txBody>
+          <a:bodyPr/>
+          <a:lstStyle/>
+          <a:p>
+            <a:r>
+              <a:rPr lang="pt-BR" dirty="0"/>
+              <a:t>Resultados</a:t>
+            </a:r>
+          </a:p>
+        </p:txBody>
+      </p:sp>
+      <p:sp>
+        <p:nvSpPr>
+          <p:cNvPr id="3" name="Espaço Reservado para Conteúdo 2">
+            <a:extLst>
+              <a:ext uri="{FF2B5EF4-FFF2-40B4-BE49-F238E27FC236}">
+                <a16:creationId xmlns:a16="http://schemas.microsoft.com/office/drawing/2014/main" id="{EC2E1DDA-B549-8F9D-BA64-18BAFB4D49A1}"/>
+              </a:ext>
+            </a:extLst>
+          </p:cNvPr>
+          <p:cNvSpPr>
+            <a:spLocks noGrp="1"/>
+          </p:cNvSpPr>
+          <p:nvPr>
+            <p:ph idx="1"/>
+          </p:nvPr>
+        </p:nvSpPr>
+        <p:spPr>
+          <a:xfrm>
+            <a:off x="838200" y="2055813"/>
+            <a:ext cx="4619171" cy="2414587"/>
+          </a:xfrm>
+        </p:spPr>
+        <p:txBody>
+          <a:bodyPr>
+            <a:normAutofit/>
+          </a:bodyPr>
+          <a:lstStyle/>
+          <a:p>
+            <a:pPr algn="just"/>
+            <a:r>
+              <a:rPr lang="pt-BR" dirty="0"/>
+              <a:t>Tabela comparativa entre as diferentes acurácias obtidas por meio do uso de cada índice</a:t>
+            </a:r>
+            <a:endParaRPr lang="pt-BR" i="1" dirty="0"/>
+          </a:p>
+          <a:p>
+            <a:pPr lvl="1" algn="just"/>
+            <a:endParaRPr lang="pt-BR" dirty="0"/>
+          </a:p>
+          <a:p>
+            <a:pPr lvl="1" algn="just"/>
+            <a:endParaRPr lang="pt-BR" sz="2800" dirty="0"/>
+          </a:p>
+          <a:p>
+            <a:pPr lvl="2" algn="just"/>
+            <a:endParaRPr lang="pt-BR" sz="2400" dirty="0"/>
+          </a:p>
+          <a:p>
+            <a:pPr algn="just"/>
+            <a:endParaRPr lang="pt-BR" dirty="0"/>
+          </a:p>
+          <a:p>
+            <a:pPr algn="just"/>
+            <a:endParaRPr lang="pt-BR" dirty="0"/>
+          </a:p>
+        </p:txBody>
+      </p:sp>
+      <p:pic>
+        <p:nvPicPr>
+          <p:cNvPr id="4" name="Picture 2" descr="Local do Evento | SBRC 2021 - Simpósio Brasileiro de Redes ...">
+            <a:extLst>
+              <a:ext uri="{FF2B5EF4-FFF2-40B4-BE49-F238E27FC236}">
+                <a16:creationId xmlns:a16="http://schemas.microsoft.com/office/drawing/2014/main" id="{C4BAF076-983A-267F-65B0-779489FA3886}"/>
+              </a:ext>
+            </a:extLst>
+          </p:cNvPr>
+          <p:cNvPicPr>
+            <a:picLocks noChangeAspect="1" noChangeArrowheads="1"/>
+          </p:cNvPicPr>
+          <p:nvPr/>
+        </p:nvPicPr>
+        <p:blipFill>
+          <a:blip r:embed="rId3">
+            <a:extLst>
+              <a:ext uri="{28A0092B-C50C-407E-A947-70E740481C1C}">
+                <a14:useLocalDpi xmlns:a14="http://schemas.microsoft.com/office/drawing/2010/main" val="0"/>
+              </a:ext>
+            </a:extLst>
+          </a:blip>
+          <a:srcRect/>
+          <a:stretch>
+            <a:fillRect/>
+          </a:stretch>
+        </p:blipFill>
+        <p:spPr bwMode="auto">
+          <a:xfrm>
+            <a:off x="8783783" y="0"/>
+            <a:ext cx="3408217" cy="1388533"/>
+          </a:xfrm>
+          <a:prstGeom prst="rect">
+            <a:avLst/>
+          </a:prstGeom>
+          <a:noFill/>
+          <a:extLst>
+            <a:ext uri="{909E8E84-426E-40DD-AFC4-6F175D3DCCD1}">
+              <a14:hiddenFill xmlns:a14="http://schemas.microsoft.com/office/drawing/2010/main">
+                <a:solidFill>
+                  <a:srgbClr val="FFFFFF"/>
+                </a:solidFill>
+              </a14:hiddenFill>
+            </a:ext>
+          </a:extLst>
+        </p:spPr>
+      </p:pic>
+      <p:pic>
+        <p:nvPicPr>
+          <p:cNvPr id="10" name="Picture 4" descr="Edições Anteriores | SBRC 2021 - Simpósio Brasileiro de Redes de  Computadores e Sistemas Distribuídos">
+            <a:extLst>
+              <a:ext uri="{FF2B5EF4-FFF2-40B4-BE49-F238E27FC236}">
+                <a16:creationId xmlns:a16="http://schemas.microsoft.com/office/drawing/2014/main" id="{93E54E16-818F-3428-C873-CEF260E428A2}"/>
+              </a:ext>
+            </a:extLst>
+          </p:cNvPr>
+          <p:cNvPicPr>
+            <a:picLocks noChangeAspect="1" noChangeArrowheads="1"/>
+          </p:cNvPicPr>
+          <p:nvPr/>
+        </p:nvPicPr>
+        <p:blipFill rotWithShape="1">
+          <a:blip r:embed="rId4">
+            <a:extLst>
+              <a:ext uri="{28A0092B-C50C-407E-A947-70E740481C1C}">
+                <a14:useLocalDpi xmlns:a14="http://schemas.microsoft.com/office/drawing/2010/main" val="0"/>
+              </a:ext>
+            </a:extLst>
+          </a:blip>
+          <a:srcRect l="18938" t="24085"/>
+          <a:stretch/>
+        </p:blipFill>
+        <p:spPr bwMode="auto">
+          <a:xfrm>
+            <a:off x="259976" y="5803900"/>
+            <a:ext cx="2762759" cy="1054100"/>
+          </a:xfrm>
+          <a:prstGeom prst="rect">
+            <a:avLst/>
+          </a:prstGeom>
+          <a:noFill/>
+          <a:extLst>
+            <a:ext uri="{909E8E84-426E-40DD-AFC4-6F175D3DCCD1}">
+              <a14:hiddenFill xmlns:a14="http://schemas.microsoft.com/office/drawing/2010/main">
+                <a:solidFill>
+                  <a:srgbClr val="FFFFFF"/>
+                </a:solidFill>
+              </a14:hiddenFill>
+            </a:ext>
+          </a:extLst>
+        </p:spPr>
+      </p:pic>
+      <p:pic>
+        <p:nvPicPr>
+          <p:cNvPr id="8" name="Imagem 7">
+            <a:extLst>
+              <a:ext uri="{FF2B5EF4-FFF2-40B4-BE49-F238E27FC236}">
+                <a16:creationId xmlns:a16="http://schemas.microsoft.com/office/drawing/2014/main" id="{54994057-E14B-0E35-CC2E-210D7A49101C}"/>
+              </a:ext>
+            </a:extLst>
+          </p:cNvPr>
+          <p:cNvPicPr>
+            <a:picLocks noChangeAspect="1"/>
+          </p:cNvPicPr>
+          <p:nvPr/>
+        </p:nvPicPr>
+        <p:blipFill>
+          <a:blip r:embed="rId5"/>
+          <a:stretch>
+            <a:fillRect/>
+          </a:stretch>
+        </p:blipFill>
+        <p:spPr>
+          <a:xfrm>
+            <a:off x="6140187" y="1369892"/>
+            <a:ext cx="5632713" cy="4997753"/>
+          </a:xfrm>
+          <a:prstGeom prst="rect">
+            <a:avLst/>
+          </a:prstGeom>
+        </p:spPr>
+      </p:pic>
+      <p:sp>
+        <p:nvSpPr>
+          <p:cNvPr id="5" name="Retângulo 4">
+            <a:extLst>
+              <a:ext uri="{FF2B5EF4-FFF2-40B4-BE49-F238E27FC236}">
+                <a16:creationId xmlns:a16="http://schemas.microsoft.com/office/drawing/2014/main" id="{98E2F0DB-C127-921E-AA07-B4A3687DBC9A}"/>
+              </a:ext>
+            </a:extLst>
+          </p:cNvPr>
+          <p:cNvSpPr/>
+          <p:nvPr/>
+        </p:nvSpPr>
+        <p:spPr>
+          <a:xfrm>
+            <a:off x="11712388" y="6349004"/>
+            <a:ext cx="439271" cy="480110"/>
+          </a:xfrm>
+          <a:prstGeom prst="rect">
+            <a:avLst/>
+          </a:prstGeom>
+          <a:solidFill>
+            <a:schemeClr val="bg1"/>
+          </a:solidFill>
+          <a:ln>
+            <a:solidFill>
+              <a:schemeClr val="bg1"/>
+            </a:solidFill>
+          </a:ln>
+        </p:spPr>
+        <p:style>
+          <a:lnRef idx="2">
+            <a:schemeClr val="accent1">
+              <a:shade val="15000"/>
+            </a:schemeClr>
+          </a:lnRef>
+          <a:fillRef idx="1">
+            <a:schemeClr val="accent1"/>
+          </a:fillRef>
+          <a:effectRef idx="0">
+            <a:schemeClr val="accent1"/>
+          </a:effectRef>
+          <a:fontRef idx="minor">
+            <a:schemeClr val="lt1"/>
+          </a:fontRef>
+        </p:style>
+        <p:txBody>
+          <a:bodyPr rtlCol="0" anchor="ctr"/>
+          <a:lstStyle/>
+          <a:p>
+            <a:pPr algn="ctr"/>
+            <a:r>
+              <a:rPr lang="pt-BR" sz="1200" dirty="0">
+                <a:solidFill>
+                  <a:schemeClr val="tx1"/>
+                </a:solidFill>
+              </a:rPr>
+              <a:t>20</a:t>
+            </a:r>
+          </a:p>
+        </p:txBody>
+      </p:sp>
+    </p:spTree>
+    <p:extLst>
+      <p:ext uri="{BB962C8B-B14F-4D97-AF65-F5344CB8AC3E}">
+        <p14:creationId xmlns:p14="http://schemas.microsoft.com/office/powerpoint/2010/main" val="771703116"/>
       </p:ext>
     </p:extLst>
   </p:cSld>
@@ -9997,6 +10397,67 @@
           </a:extLst>
         </p:spPr>
       </p:pic>
+      <p:sp>
+        <p:nvSpPr>
+          <p:cNvPr id="5" name="Retângulo 4">
+            <a:extLst>
+              <a:ext uri="{FF2B5EF4-FFF2-40B4-BE49-F238E27FC236}">
+                <a16:creationId xmlns:a16="http://schemas.microsoft.com/office/drawing/2014/main" id="{0FF2D678-4AF9-587B-2F65-3B57E58356A4}"/>
+              </a:ext>
+            </a:extLst>
+          </p:cNvPr>
+          <p:cNvSpPr/>
+          <p:nvPr/>
+        </p:nvSpPr>
+        <p:spPr>
+          <a:xfrm>
+            <a:off x="11712388" y="6349004"/>
+            <a:ext cx="439271" cy="480110"/>
+          </a:xfrm>
+          <a:prstGeom prst="rect">
+            <a:avLst/>
+          </a:prstGeom>
+          <a:solidFill>
+            <a:schemeClr val="bg1"/>
+          </a:solidFill>
+          <a:ln>
+            <a:solidFill>
+              <a:schemeClr val="bg1"/>
+            </a:solidFill>
+          </a:ln>
+        </p:spPr>
+        <p:style>
+          <a:lnRef idx="2">
+            <a:schemeClr val="accent1">
+              <a:shade val="15000"/>
+            </a:schemeClr>
+          </a:lnRef>
+          <a:fillRef idx="1">
+            <a:schemeClr val="accent1"/>
+          </a:fillRef>
+          <a:effectRef idx="0">
+            <a:schemeClr val="accent1"/>
+          </a:effectRef>
+          <a:fontRef idx="minor">
+            <a:schemeClr val="lt1"/>
+          </a:fontRef>
+        </p:style>
+        <p:txBody>
+          <a:bodyPr rtlCol="0" anchor="ctr"/>
+          <a:lstStyle/>
+          <a:p>
+            <a:pPr algn="ctr"/>
+            <a:r>
+              <a:rPr lang="pt-BR" sz="1200" dirty="0">
+                <a:solidFill>
+                  <a:schemeClr val="tx1"/>
+                </a:solidFill>
+              </a:rPr>
+              <a:t>2</a:t>
+            </a:r>
+          </a:p>
+        </p:txBody>
+      </p:sp>
     </p:spTree>
     <p:extLst>
       <p:ext uri="{BB962C8B-B14F-4D97-AF65-F5344CB8AC3E}">
@@ -10043,38 +10504,43 @@
             <p:ph type="title"/>
           </p:nvPr>
         </p:nvSpPr>
-        <p:spPr/>
-        <p:txBody>
-          <a:bodyPr/>
-          <a:lstStyle/>
-          <a:p>
-            <a:r>
-              <a:rPr lang="pt-BR" dirty="0"/>
-              <a:t>Resultados</a:t>
-            </a:r>
-          </a:p>
-        </p:txBody>
-      </p:sp>
-      <p:sp>
-        <p:nvSpPr>
-          <p:cNvPr id="3" name="Espaço Reservado para Conteúdo 2">
-            <a:extLst>
-              <a:ext uri="{FF2B5EF4-FFF2-40B4-BE49-F238E27FC236}">
-                <a16:creationId xmlns:a16="http://schemas.microsoft.com/office/drawing/2014/main" id="{EC2E1DDA-B549-8F9D-BA64-18BAFB4D49A1}"/>
-              </a:ext>
-            </a:extLst>
-          </p:cNvPr>
-          <p:cNvSpPr>
-            <a:spLocks noGrp="1"/>
-          </p:cNvSpPr>
-          <p:nvPr>
-            <p:ph idx="1"/>
-          </p:nvPr>
-        </p:nvSpPr>
         <p:spPr>
           <a:xfrm>
-            <a:off x="838200" y="2055813"/>
-            <a:ext cx="4619171" cy="2414587"/>
+            <a:off x="838200" y="365125"/>
+            <a:ext cx="3796553" cy="1325563"/>
+          </a:xfrm>
+        </p:spPr>
+        <p:txBody>
+          <a:bodyPr/>
+          <a:lstStyle/>
+          <a:p>
+            <a:r>
+              <a:rPr lang="pt-BR" dirty="0"/>
+              <a:t>Resultados</a:t>
+            </a:r>
+          </a:p>
+        </p:txBody>
+      </p:sp>
+      <p:sp>
+        <p:nvSpPr>
+          <p:cNvPr id="3" name="Espaço Reservado para Conteúdo 2">
+            <a:extLst>
+              <a:ext uri="{FF2B5EF4-FFF2-40B4-BE49-F238E27FC236}">
+                <a16:creationId xmlns:a16="http://schemas.microsoft.com/office/drawing/2014/main" id="{EC2E1DDA-B549-8F9D-BA64-18BAFB4D49A1}"/>
+              </a:ext>
+            </a:extLst>
+          </p:cNvPr>
+          <p:cNvSpPr>
+            <a:spLocks noGrp="1"/>
+          </p:cNvSpPr>
+          <p:nvPr>
+            <p:ph idx="1"/>
+          </p:nvPr>
+        </p:nvSpPr>
+        <p:spPr>
+          <a:xfrm>
+            <a:off x="618565" y="2232212"/>
+            <a:ext cx="3645249" cy="3146612"/>
           </a:xfrm>
         </p:spPr>
         <p:txBody>
@@ -10083,88 +10549,42 @@
           </a:bodyPr>
           <a:lstStyle/>
           <a:p>
-            <a:pPr algn="just"/>
-            <a:r>
-              <a:rPr lang="pt-BR" dirty="0"/>
-              <a:t>Tabela comparativa entre as diferentes acurácias obtidas por meio do uso de cada índice</a:t>
-            </a:r>
-            <a:endParaRPr lang="pt-BR" i="1" dirty="0"/>
-          </a:p>
-          <a:p>
-            <a:pPr lvl="1" algn="just"/>
+            <a:r>
+              <a:rPr lang="pt-BR" dirty="0"/>
+              <a:t>Análise de resultados:</a:t>
+            </a:r>
+          </a:p>
+          <a:p>
             <a:endParaRPr lang="pt-BR" dirty="0"/>
           </a:p>
           <a:p>
-            <a:pPr lvl="1" algn="just"/>
-            <a:endParaRPr lang="pt-BR" sz="2800" dirty="0"/>
-          </a:p>
-          <a:p>
-            <a:pPr lvl="2" algn="just"/>
-            <a:endParaRPr lang="pt-BR" sz="2400" dirty="0"/>
-          </a:p>
-          <a:p>
-            <a:pPr algn="just"/>
+            <a:pPr lvl="1"/>
+            <a:r>
+              <a:rPr lang="pt-BR" dirty="0"/>
+              <a:t>Comparação do tempo de execução entre os diferentes índices utilizados</a:t>
+            </a:r>
+          </a:p>
+          <a:p>
+            <a:pPr marL="971550" lvl="1" indent="-514350" algn="just">
+              <a:buFont typeface="+mj-lt"/>
+              <a:buAutoNum type="arabicPeriod"/>
+            </a:pPr>
             <a:endParaRPr lang="pt-BR" dirty="0"/>
           </a:p>
           <a:p>
-            <a:pPr algn="just"/>
+            <a:pPr marL="0" indent="0" algn="just">
+              <a:buNone/>
+            </a:pPr>
             <a:endParaRPr lang="pt-BR" dirty="0"/>
           </a:p>
         </p:txBody>
       </p:sp>
       <p:pic>
         <p:nvPicPr>
-          <p:cNvPr id="4" name="Picture 2" descr="Local do Evento | SBRC 2021 - Simpósio Brasileiro de Redes ...">
-            <a:extLst>
-              <a:ext uri="{FF2B5EF4-FFF2-40B4-BE49-F238E27FC236}">
-                <a16:creationId xmlns:a16="http://schemas.microsoft.com/office/drawing/2014/main" id="{C4BAF076-983A-267F-65B0-779489FA3886}"/>
-              </a:ext>
-            </a:extLst>
-          </p:cNvPr>
-          <p:cNvPicPr>
-            <a:picLocks noChangeAspect="1" noChangeArrowheads="1"/>
-          </p:cNvPicPr>
-          <p:nvPr/>
-        </p:nvPicPr>
-        <p:blipFill>
-          <a:blip r:embed="rId3">
-            <a:extLst>
-              <a:ext uri="{28A0092B-C50C-407E-A947-70E740481C1C}">
-                <a14:useLocalDpi xmlns:a14="http://schemas.microsoft.com/office/drawing/2010/main" val="0"/>
-              </a:ext>
-            </a:extLst>
-          </a:blip>
-          <a:srcRect/>
-          <a:stretch>
-            <a:fillRect/>
-          </a:stretch>
-        </p:blipFill>
-        <p:spPr bwMode="auto">
-          <a:xfrm>
-            <a:off x="8783783" y="0"/>
-            <a:ext cx="3408217" cy="1388533"/>
-          </a:xfrm>
-          <a:prstGeom prst="rect">
-            <a:avLst/>
-          </a:prstGeom>
-          <a:noFill/>
-          <a:extLst>
-            <a:ext uri="{909E8E84-426E-40DD-AFC4-6F175D3DCCD1}">
-              <a14:hiddenFill xmlns:a14="http://schemas.microsoft.com/office/drawing/2010/main">
-                <a:solidFill>
-                  <a:srgbClr val="FFFFFF"/>
-                </a:solidFill>
-              </a14:hiddenFill>
-            </a:ext>
-          </a:extLst>
-        </p:spPr>
-      </p:pic>
-      <p:pic>
-        <p:nvPicPr>
-          <p:cNvPr id="10" name="Picture 4" descr="Edições Anteriores | SBRC 2021 - Simpósio Brasileiro de Redes de  Computadores e Sistemas Distribuídos">
-            <a:extLst>
-              <a:ext uri="{FF2B5EF4-FFF2-40B4-BE49-F238E27FC236}">
-                <a16:creationId xmlns:a16="http://schemas.microsoft.com/office/drawing/2014/main" id="{93E54E16-818F-3428-C873-CEF260E428A2}"/>
+          <p:cNvPr id="5" name="Picture 4" descr="Edições Anteriores | SBRC 2021 - Simpósio Brasileiro de Redes de  Computadores e Sistemas Distribuídos">
+            <a:extLst>
+              <a:ext uri="{FF2B5EF4-FFF2-40B4-BE49-F238E27FC236}">
+                <a16:creationId xmlns:a16="http://schemas.microsoft.com/office/drawing/2014/main" id="{EE629CB4-DE61-E1C8-0777-7BFAD2ACB3C1}"/>
               </a:ext>
             </a:extLst>
           </p:cNvPr>
@@ -10174,7 +10594,7 @@
           <p:nvPr/>
         </p:nvPicPr>
         <p:blipFill rotWithShape="1">
-          <a:blip r:embed="rId4">
+          <a:blip r:embed="rId3">
             <a:extLst>
               <a:ext uri="{28A0092B-C50C-407E-A947-70E740481C1C}">
                 <a14:useLocalDpi xmlns:a14="http://schemas.microsoft.com/office/drawing/2010/main" val="0"/>
@@ -10209,202 +10629,6 @@
           <p:cNvPr id="8" name="Imagem 7">
             <a:extLst>
               <a:ext uri="{FF2B5EF4-FFF2-40B4-BE49-F238E27FC236}">
-                <a16:creationId xmlns:a16="http://schemas.microsoft.com/office/drawing/2014/main" id="{54994057-E14B-0E35-CC2E-210D7A49101C}"/>
-              </a:ext>
-            </a:extLst>
-          </p:cNvPr>
-          <p:cNvPicPr>
-            <a:picLocks noChangeAspect="1"/>
-          </p:cNvPicPr>
-          <p:nvPr/>
-        </p:nvPicPr>
-        <p:blipFill>
-          <a:blip r:embed="rId5"/>
-          <a:stretch>
-            <a:fillRect/>
-          </a:stretch>
-        </p:blipFill>
-        <p:spPr>
-          <a:xfrm>
-            <a:off x="6140187" y="1495122"/>
-            <a:ext cx="5632713" cy="4997753"/>
-          </a:xfrm>
-          <a:prstGeom prst="rect">
-            <a:avLst/>
-          </a:prstGeom>
-        </p:spPr>
-      </p:pic>
-    </p:spTree>
-    <p:extLst>
-      <p:ext uri="{BB962C8B-B14F-4D97-AF65-F5344CB8AC3E}">
-        <p14:creationId xmlns:p14="http://schemas.microsoft.com/office/powerpoint/2010/main" val="771703116"/>
-      </p:ext>
-    </p:extLst>
-  </p:cSld>
-  <p:clrMapOvr>
-    <a:masterClrMapping/>
-  </p:clrMapOvr>
-</p:sld>
-</file>
-
-<file path=ppt/slides/slide21.xml><?xml version="1.0" encoding="utf-8"?>
-<p:sld xmlns:a="http://schemas.openxmlformats.org/drawingml/2006/main" xmlns:r="http://schemas.openxmlformats.org/officeDocument/2006/relationships" xmlns:p="http://schemas.openxmlformats.org/presentationml/2006/main">
-  <p:cSld>
-    <p:spTree>
-      <p:nvGrpSpPr>
-        <p:cNvPr id="1" name=""/>
-        <p:cNvGrpSpPr/>
-        <p:nvPr/>
-      </p:nvGrpSpPr>
-      <p:grpSpPr>
-        <a:xfrm>
-          <a:off x="0" y="0"/>
-          <a:ext cx="0" cy="0"/>
-          <a:chOff x="0" y="0"/>
-          <a:chExt cx="0" cy="0"/>
-        </a:xfrm>
-      </p:grpSpPr>
-      <p:sp>
-        <p:nvSpPr>
-          <p:cNvPr id="2" name="Título 1">
-            <a:extLst>
-              <a:ext uri="{FF2B5EF4-FFF2-40B4-BE49-F238E27FC236}">
-                <a16:creationId xmlns:a16="http://schemas.microsoft.com/office/drawing/2014/main" id="{4549A9CF-9A04-0D0B-3F38-47569BAC879F}"/>
-              </a:ext>
-            </a:extLst>
-          </p:cNvPr>
-          <p:cNvSpPr>
-            <a:spLocks noGrp="1"/>
-          </p:cNvSpPr>
-          <p:nvPr>
-            <p:ph type="title"/>
-          </p:nvPr>
-        </p:nvSpPr>
-        <p:spPr>
-          <a:xfrm>
-            <a:off x="838200" y="365125"/>
-            <a:ext cx="3796553" cy="1325563"/>
-          </a:xfrm>
-        </p:spPr>
-        <p:txBody>
-          <a:bodyPr/>
-          <a:lstStyle/>
-          <a:p>
-            <a:r>
-              <a:rPr lang="pt-BR" dirty="0"/>
-              <a:t>Resultados</a:t>
-            </a:r>
-          </a:p>
-        </p:txBody>
-      </p:sp>
-      <p:sp>
-        <p:nvSpPr>
-          <p:cNvPr id="3" name="Espaço Reservado para Conteúdo 2">
-            <a:extLst>
-              <a:ext uri="{FF2B5EF4-FFF2-40B4-BE49-F238E27FC236}">
-                <a16:creationId xmlns:a16="http://schemas.microsoft.com/office/drawing/2014/main" id="{EC2E1DDA-B549-8F9D-BA64-18BAFB4D49A1}"/>
-              </a:ext>
-            </a:extLst>
-          </p:cNvPr>
-          <p:cNvSpPr>
-            <a:spLocks noGrp="1"/>
-          </p:cNvSpPr>
-          <p:nvPr>
-            <p:ph idx="1"/>
-          </p:nvPr>
-        </p:nvSpPr>
-        <p:spPr>
-          <a:xfrm>
-            <a:off x="618565" y="2232212"/>
-            <a:ext cx="3645249" cy="3146612"/>
-          </a:xfrm>
-        </p:spPr>
-        <p:txBody>
-          <a:bodyPr>
-            <a:normAutofit/>
-          </a:bodyPr>
-          <a:lstStyle/>
-          <a:p>
-            <a:r>
-              <a:rPr lang="pt-BR" dirty="0"/>
-              <a:t>Análise de resultados:</a:t>
-            </a:r>
-          </a:p>
-          <a:p>
-            <a:endParaRPr lang="pt-BR" dirty="0"/>
-          </a:p>
-          <a:p>
-            <a:pPr lvl="1"/>
-            <a:r>
-              <a:rPr lang="pt-BR" dirty="0"/>
-              <a:t>Comparação do tempo de execução entre os diferentes índices utilizados</a:t>
-            </a:r>
-          </a:p>
-          <a:p>
-            <a:pPr marL="971550" lvl="1" indent="-514350" algn="just">
-              <a:buFont typeface="+mj-lt"/>
-              <a:buAutoNum type="arabicPeriod"/>
-            </a:pPr>
-            <a:endParaRPr lang="pt-BR" dirty="0"/>
-          </a:p>
-          <a:p>
-            <a:pPr marL="0" indent="0" algn="just">
-              <a:buNone/>
-            </a:pPr>
-            <a:endParaRPr lang="pt-BR" dirty="0"/>
-          </a:p>
-        </p:txBody>
-      </p:sp>
-      <p:pic>
-        <p:nvPicPr>
-          <p:cNvPr id="5" name="Picture 4" descr="Edições Anteriores | SBRC 2021 - Simpósio Brasileiro de Redes de  Computadores e Sistemas Distribuídos">
-            <a:extLst>
-              <a:ext uri="{FF2B5EF4-FFF2-40B4-BE49-F238E27FC236}">
-                <a16:creationId xmlns:a16="http://schemas.microsoft.com/office/drawing/2014/main" id="{EE629CB4-DE61-E1C8-0777-7BFAD2ACB3C1}"/>
-              </a:ext>
-            </a:extLst>
-          </p:cNvPr>
-          <p:cNvPicPr>
-            <a:picLocks noChangeAspect="1" noChangeArrowheads="1"/>
-          </p:cNvPicPr>
-          <p:nvPr/>
-        </p:nvPicPr>
-        <p:blipFill rotWithShape="1">
-          <a:blip r:embed="rId3">
-            <a:extLst>
-              <a:ext uri="{28A0092B-C50C-407E-A947-70E740481C1C}">
-                <a14:useLocalDpi xmlns:a14="http://schemas.microsoft.com/office/drawing/2010/main" val="0"/>
-              </a:ext>
-            </a:extLst>
-          </a:blip>
-          <a:srcRect l="18938" t="24085"/>
-          <a:stretch/>
-        </p:blipFill>
-        <p:spPr bwMode="auto">
-          <a:xfrm>
-            <a:off x="259976" y="5803900"/>
-            <a:ext cx="2762759" cy="1054100"/>
-          </a:xfrm>
-          <a:prstGeom prst="rect">
-            <a:avLst/>
-          </a:prstGeom>
-          <a:noFill/>
-          <a:extLst>
-            <a:ext uri="{909E8E84-426E-40DD-AFC4-6F175D3DCCD1}">
-              <a14:hiddenFill xmlns:a14="http://schemas.microsoft.com/office/drawing/2010/main">
-                <a:solidFill>
-                  <a:srgbClr val="FFFFFF"/>
-                </a:solidFill>
-              </a14:hiddenFill>
-            </a:ext>
-          </a:extLst>
-        </p:spPr>
-      </p:pic>
-      <p:pic>
-        <p:nvPicPr>
-          <p:cNvPr id="8" name="Imagem 7">
-            <a:extLst>
-              <a:ext uri="{FF2B5EF4-FFF2-40B4-BE49-F238E27FC236}">
                 <a16:creationId xmlns:a16="http://schemas.microsoft.com/office/drawing/2014/main" id="{1CCE6AC8-5698-0A9A-BF9E-1A7BA0B5A470}"/>
               </a:ext>
             </a:extLst>
@@ -10422,14 +10646,75 @@
         </p:blipFill>
         <p:spPr>
           <a:xfrm>
-            <a:off x="4263814" y="219635"/>
-            <a:ext cx="7795474" cy="6418729"/>
+            <a:off x="4313244" y="75764"/>
+            <a:ext cx="7618779" cy="6273240"/>
           </a:xfrm>
           <a:prstGeom prst="rect">
             <a:avLst/>
           </a:prstGeom>
         </p:spPr>
       </p:pic>
+      <p:sp>
+        <p:nvSpPr>
+          <p:cNvPr id="4" name="Retângulo 3">
+            <a:extLst>
+              <a:ext uri="{FF2B5EF4-FFF2-40B4-BE49-F238E27FC236}">
+                <a16:creationId xmlns:a16="http://schemas.microsoft.com/office/drawing/2014/main" id="{233CB45B-07C8-92A2-83D0-D12825B426F8}"/>
+              </a:ext>
+            </a:extLst>
+          </p:cNvPr>
+          <p:cNvSpPr/>
+          <p:nvPr/>
+        </p:nvSpPr>
+        <p:spPr>
+          <a:xfrm>
+            <a:off x="11712388" y="6349004"/>
+            <a:ext cx="439271" cy="480110"/>
+          </a:xfrm>
+          <a:prstGeom prst="rect">
+            <a:avLst/>
+          </a:prstGeom>
+          <a:solidFill>
+            <a:schemeClr val="bg1"/>
+          </a:solidFill>
+          <a:ln>
+            <a:solidFill>
+              <a:schemeClr val="bg1"/>
+            </a:solidFill>
+          </a:ln>
+        </p:spPr>
+        <p:style>
+          <a:lnRef idx="2">
+            <a:schemeClr val="accent1">
+              <a:shade val="15000"/>
+            </a:schemeClr>
+          </a:lnRef>
+          <a:fillRef idx="1">
+            <a:schemeClr val="accent1"/>
+          </a:fillRef>
+          <a:effectRef idx="0">
+            <a:schemeClr val="accent1"/>
+          </a:effectRef>
+          <a:fontRef idx="minor">
+            <a:schemeClr val="lt1"/>
+          </a:fontRef>
+        </p:style>
+        <p:txBody>
+          <a:bodyPr rtlCol="0" anchor="ctr"/>
+          <a:lstStyle/>
+          <a:p>
+            <a:pPr algn="ctr"/>
+            <a:r>
+              <a:rPr lang="pt-BR" sz="1200" dirty="0">
+                <a:solidFill>
+                  <a:schemeClr val="tx1"/>
+                </a:solidFill>
+              </a:rPr>
+              <a:t>21</a:t>
+            </a:r>
+          </a:p>
+        </p:txBody>
+      </p:sp>
     </p:spTree>
     <p:extLst>
       <p:ext uri="{BB962C8B-B14F-4D97-AF65-F5344CB8AC3E}">
@@ -10443,7 +10728,7 @@
 </p:sld>
 </file>
 
-<file path=ppt/slides/slide22.xml><?xml version="1.0" encoding="utf-8"?>
+<file path=ppt/slides/slide21.xml><?xml version="1.0" encoding="utf-8"?>
 <p:sld xmlns:a="http://schemas.openxmlformats.org/drawingml/2006/main" xmlns:r="http://schemas.openxmlformats.org/officeDocument/2006/relationships" xmlns:p="http://schemas.openxmlformats.org/presentationml/2006/main">
   <p:cSld>
     <p:spTree>
@@ -10681,6 +10966,67 @@
           </a:extLst>
         </p:spPr>
       </p:pic>
+      <p:sp>
+        <p:nvSpPr>
+          <p:cNvPr id="6" name="Retângulo 5">
+            <a:extLst>
+              <a:ext uri="{FF2B5EF4-FFF2-40B4-BE49-F238E27FC236}">
+                <a16:creationId xmlns:a16="http://schemas.microsoft.com/office/drawing/2014/main" id="{792F037F-07B6-F6FA-854D-018C69D1577E}"/>
+              </a:ext>
+            </a:extLst>
+          </p:cNvPr>
+          <p:cNvSpPr/>
+          <p:nvPr/>
+        </p:nvSpPr>
+        <p:spPr>
+          <a:xfrm>
+            <a:off x="11712388" y="6349004"/>
+            <a:ext cx="439271" cy="480110"/>
+          </a:xfrm>
+          <a:prstGeom prst="rect">
+            <a:avLst/>
+          </a:prstGeom>
+          <a:solidFill>
+            <a:schemeClr val="bg1"/>
+          </a:solidFill>
+          <a:ln>
+            <a:solidFill>
+              <a:schemeClr val="bg1"/>
+            </a:solidFill>
+          </a:ln>
+        </p:spPr>
+        <p:style>
+          <a:lnRef idx="2">
+            <a:schemeClr val="accent1">
+              <a:shade val="15000"/>
+            </a:schemeClr>
+          </a:lnRef>
+          <a:fillRef idx="1">
+            <a:schemeClr val="accent1"/>
+          </a:fillRef>
+          <a:effectRef idx="0">
+            <a:schemeClr val="accent1"/>
+          </a:effectRef>
+          <a:fontRef idx="minor">
+            <a:schemeClr val="lt1"/>
+          </a:fontRef>
+        </p:style>
+        <p:txBody>
+          <a:bodyPr rtlCol="0" anchor="ctr"/>
+          <a:lstStyle/>
+          <a:p>
+            <a:pPr algn="ctr"/>
+            <a:r>
+              <a:rPr lang="pt-BR" sz="1200" dirty="0">
+                <a:solidFill>
+                  <a:schemeClr val="tx1"/>
+                </a:solidFill>
+              </a:rPr>
+              <a:t>22</a:t>
+            </a:r>
+          </a:p>
+        </p:txBody>
+      </p:sp>
     </p:spTree>
     <p:extLst>
       <p:ext uri="{BB962C8B-B14F-4D97-AF65-F5344CB8AC3E}">
@@ -10694,7 +11040,7 @@
 </p:sld>
 </file>
 
-<file path=ppt/slides/slide23.xml><?xml version="1.0" encoding="utf-8"?>
+<file path=ppt/slides/slide22.xml><?xml version="1.0" encoding="utf-8"?>
 <p:sld xmlns:a="http://schemas.openxmlformats.org/drawingml/2006/main" xmlns:r="http://schemas.openxmlformats.org/officeDocument/2006/relationships" xmlns:p="http://schemas.openxmlformats.org/presentationml/2006/main">
   <p:cSld>
     <p:spTree>
@@ -10921,6 +11267,67 @@
           </a:prstGeom>
         </p:spPr>
       </p:pic>
+      <p:sp>
+        <p:nvSpPr>
+          <p:cNvPr id="7" name="Retângulo 6">
+            <a:extLst>
+              <a:ext uri="{FF2B5EF4-FFF2-40B4-BE49-F238E27FC236}">
+                <a16:creationId xmlns:a16="http://schemas.microsoft.com/office/drawing/2014/main" id="{8B286707-DB3F-385D-8F0E-1396685AD0EA}"/>
+              </a:ext>
+            </a:extLst>
+          </p:cNvPr>
+          <p:cNvSpPr/>
+          <p:nvPr/>
+        </p:nvSpPr>
+        <p:spPr>
+          <a:xfrm>
+            <a:off x="11712388" y="6349004"/>
+            <a:ext cx="439271" cy="480110"/>
+          </a:xfrm>
+          <a:prstGeom prst="rect">
+            <a:avLst/>
+          </a:prstGeom>
+          <a:solidFill>
+            <a:schemeClr val="bg1"/>
+          </a:solidFill>
+          <a:ln>
+            <a:solidFill>
+              <a:schemeClr val="bg1"/>
+            </a:solidFill>
+          </a:ln>
+        </p:spPr>
+        <p:style>
+          <a:lnRef idx="2">
+            <a:schemeClr val="accent1">
+              <a:shade val="15000"/>
+            </a:schemeClr>
+          </a:lnRef>
+          <a:fillRef idx="1">
+            <a:schemeClr val="accent1"/>
+          </a:fillRef>
+          <a:effectRef idx="0">
+            <a:schemeClr val="accent1"/>
+          </a:effectRef>
+          <a:fontRef idx="minor">
+            <a:schemeClr val="lt1"/>
+          </a:fontRef>
+        </p:style>
+        <p:txBody>
+          <a:bodyPr rtlCol="0" anchor="ctr"/>
+          <a:lstStyle/>
+          <a:p>
+            <a:pPr algn="ctr"/>
+            <a:r>
+              <a:rPr lang="pt-BR" sz="1200" dirty="0">
+                <a:solidFill>
+                  <a:schemeClr val="tx1"/>
+                </a:solidFill>
+              </a:rPr>
+              <a:t>23</a:t>
+            </a:r>
+          </a:p>
+        </p:txBody>
+      </p:sp>
     </p:spTree>
     <p:extLst>
       <p:ext uri="{BB962C8B-B14F-4D97-AF65-F5344CB8AC3E}">
@@ -10934,7 +11341,7 @@
 </p:sld>
 </file>
 
-<file path=ppt/slides/slide24.xml><?xml version="1.0" encoding="utf-8"?>
+<file path=ppt/slides/slide23.xml><?xml version="1.0" encoding="utf-8"?>
 <p:sld xmlns:a="http://schemas.openxmlformats.org/drawingml/2006/main" xmlns:r="http://schemas.openxmlformats.org/officeDocument/2006/relationships" xmlns:p="http://schemas.openxmlformats.org/presentationml/2006/main">
   <p:cSld>
     <p:spTree>
@@ -11319,6 +11726,67 @@
           </a:prstGeom>
         </p:spPr>
       </p:pic>
+      <p:sp>
+        <p:nvSpPr>
+          <p:cNvPr id="3" name="Retângulo 2">
+            <a:extLst>
+              <a:ext uri="{FF2B5EF4-FFF2-40B4-BE49-F238E27FC236}">
+                <a16:creationId xmlns:a16="http://schemas.microsoft.com/office/drawing/2014/main" id="{9CEA37E4-2445-7397-1EFC-C4837120E8F7}"/>
+              </a:ext>
+            </a:extLst>
+          </p:cNvPr>
+          <p:cNvSpPr/>
+          <p:nvPr/>
+        </p:nvSpPr>
+        <p:spPr>
+          <a:xfrm>
+            <a:off x="11712388" y="6349004"/>
+            <a:ext cx="439271" cy="480110"/>
+          </a:xfrm>
+          <a:prstGeom prst="rect">
+            <a:avLst/>
+          </a:prstGeom>
+          <a:solidFill>
+            <a:schemeClr val="bg1"/>
+          </a:solidFill>
+          <a:ln>
+            <a:solidFill>
+              <a:schemeClr val="bg1"/>
+            </a:solidFill>
+          </a:ln>
+        </p:spPr>
+        <p:style>
+          <a:lnRef idx="2">
+            <a:schemeClr val="accent1">
+              <a:shade val="15000"/>
+            </a:schemeClr>
+          </a:lnRef>
+          <a:fillRef idx="1">
+            <a:schemeClr val="accent1"/>
+          </a:fillRef>
+          <a:effectRef idx="0">
+            <a:schemeClr val="accent1"/>
+          </a:effectRef>
+          <a:fontRef idx="minor">
+            <a:schemeClr val="lt1"/>
+          </a:fontRef>
+        </p:style>
+        <p:txBody>
+          <a:bodyPr rtlCol="0" anchor="ctr"/>
+          <a:lstStyle/>
+          <a:p>
+            <a:pPr algn="ctr"/>
+            <a:r>
+              <a:rPr lang="pt-BR" sz="1200" dirty="0">
+                <a:solidFill>
+                  <a:schemeClr val="tx1"/>
+                </a:solidFill>
+              </a:rPr>
+              <a:t>24</a:t>
+            </a:r>
+          </a:p>
+        </p:txBody>
+      </p:sp>
     </p:spTree>
     <p:extLst>
       <p:ext uri="{BB962C8B-B14F-4D97-AF65-F5344CB8AC3E}">
@@ -11332,7 +11800,7 @@
 </p:sld>
 </file>
 
-<file path=ppt/slides/slide25.xml><?xml version="1.0" encoding="utf-8"?>
+<file path=ppt/slides/slide24.xml><?xml version="1.0" encoding="utf-8"?>
 <p:sld xmlns:a="http://schemas.openxmlformats.org/drawingml/2006/main" xmlns:r="http://schemas.openxmlformats.org/officeDocument/2006/relationships" xmlns:p="http://schemas.openxmlformats.org/presentationml/2006/main">
   <p:cSld>
     <p:spTree>
@@ -11519,6 +11987,128 @@
           </a:extLst>
         </p:spPr>
       </p:pic>
+      <p:sp>
+        <p:nvSpPr>
+          <p:cNvPr id="6" name="Retângulo 5">
+            <a:extLst>
+              <a:ext uri="{FF2B5EF4-FFF2-40B4-BE49-F238E27FC236}">
+                <a16:creationId xmlns:a16="http://schemas.microsoft.com/office/drawing/2014/main" id="{FA8FDD4D-2E63-E6A5-56D6-174C26E92BF0}"/>
+              </a:ext>
+            </a:extLst>
+          </p:cNvPr>
+          <p:cNvSpPr/>
+          <p:nvPr/>
+        </p:nvSpPr>
+        <p:spPr>
+          <a:xfrm>
+            <a:off x="11712388" y="6349004"/>
+            <a:ext cx="439271" cy="480110"/>
+          </a:xfrm>
+          <a:prstGeom prst="rect">
+            <a:avLst/>
+          </a:prstGeom>
+          <a:solidFill>
+            <a:schemeClr val="bg1"/>
+          </a:solidFill>
+          <a:ln>
+            <a:solidFill>
+              <a:schemeClr val="bg1"/>
+            </a:solidFill>
+          </a:ln>
+        </p:spPr>
+        <p:style>
+          <a:lnRef idx="2">
+            <a:schemeClr val="accent1">
+              <a:shade val="15000"/>
+            </a:schemeClr>
+          </a:lnRef>
+          <a:fillRef idx="1">
+            <a:schemeClr val="accent1"/>
+          </a:fillRef>
+          <a:effectRef idx="0">
+            <a:schemeClr val="accent1"/>
+          </a:effectRef>
+          <a:fontRef idx="minor">
+            <a:schemeClr val="lt1"/>
+          </a:fontRef>
+        </p:style>
+        <p:txBody>
+          <a:bodyPr rtlCol="0" anchor="ctr"/>
+          <a:lstStyle/>
+          <a:p>
+            <a:pPr algn="ctr"/>
+            <a:r>
+              <a:rPr lang="pt-BR" sz="1200" dirty="0">
+                <a:solidFill>
+                  <a:schemeClr val="tx1"/>
+                </a:solidFill>
+              </a:rPr>
+              <a:t>1</a:t>
+            </a:r>
+          </a:p>
+        </p:txBody>
+      </p:sp>
+      <p:sp>
+        <p:nvSpPr>
+          <p:cNvPr id="7" name="Retângulo 6">
+            <a:extLst>
+              <a:ext uri="{FF2B5EF4-FFF2-40B4-BE49-F238E27FC236}">
+                <a16:creationId xmlns:a16="http://schemas.microsoft.com/office/drawing/2014/main" id="{F398723F-9AF3-F1F3-3AB2-957EB9A3720E}"/>
+              </a:ext>
+            </a:extLst>
+          </p:cNvPr>
+          <p:cNvSpPr/>
+          <p:nvPr/>
+        </p:nvSpPr>
+        <p:spPr>
+          <a:xfrm>
+            <a:off x="11712387" y="6330950"/>
+            <a:ext cx="439271" cy="480110"/>
+          </a:xfrm>
+          <a:prstGeom prst="rect">
+            <a:avLst/>
+          </a:prstGeom>
+          <a:solidFill>
+            <a:schemeClr val="bg1"/>
+          </a:solidFill>
+          <a:ln>
+            <a:solidFill>
+              <a:schemeClr val="bg1"/>
+            </a:solidFill>
+          </a:ln>
+        </p:spPr>
+        <p:style>
+          <a:lnRef idx="2">
+            <a:schemeClr val="accent1">
+              <a:shade val="15000"/>
+            </a:schemeClr>
+          </a:lnRef>
+          <a:fillRef idx="1">
+            <a:schemeClr val="accent1"/>
+          </a:fillRef>
+          <a:effectRef idx="0">
+            <a:schemeClr val="accent1"/>
+          </a:effectRef>
+          <a:fontRef idx="minor">
+            <a:schemeClr val="lt1"/>
+          </a:fontRef>
+        </p:style>
+        <p:txBody>
+          <a:bodyPr rtlCol="0" anchor="ctr"/>
+          <a:lstStyle/>
+          <a:p>
+            <a:pPr algn="ctr"/>
+            <a:r>
+              <a:rPr lang="pt-BR" sz="1200" dirty="0">
+                <a:solidFill>
+                  <a:schemeClr val="tx1"/>
+                </a:solidFill>
+              </a:rPr>
+              <a:t>25</a:t>
+            </a:r>
+          </a:p>
+        </p:txBody>
+      </p:sp>
     </p:spTree>
     <p:extLst>
       <p:ext uri="{BB962C8B-B14F-4D97-AF65-F5344CB8AC3E}">
@@ -11532,7 +12122,7 @@
 </p:sld>
 </file>
 
-<file path=ppt/slides/slide26.xml><?xml version="1.0" encoding="utf-8"?>
+<file path=ppt/slides/slide25.xml><?xml version="1.0" encoding="utf-8"?>
 <p:sld xmlns:a="http://schemas.openxmlformats.org/drawingml/2006/main" xmlns:r="http://schemas.openxmlformats.org/officeDocument/2006/relationships" xmlns:p="http://schemas.openxmlformats.org/presentationml/2006/main">
   <p:cSld>
     <p:spTree>
@@ -11772,6 +12362,67 @@
             <a:r>
               <a:rPr lang="pt-BR" dirty="0"/>
               <a:t>04 de Junho de 2024</a:t>
+            </a:r>
+          </a:p>
+        </p:txBody>
+      </p:sp>
+      <p:sp>
+        <p:nvSpPr>
+          <p:cNvPr id="2" name="Retângulo 1">
+            <a:extLst>
+              <a:ext uri="{FF2B5EF4-FFF2-40B4-BE49-F238E27FC236}">
+                <a16:creationId xmlns:a16="http://schemas.microsoft.com/office/drawing/2014/main" id="{49C8FB35-24E7-5192-5439-70FDF806F81F}"/>
+              </a:ext>
+            </a:extLst>
+          </p:cNvPr>
+          <p:cNvSpPr/>
+          <p:nvPr/>
+        </p:nvSpPr>
+        <p:spPr>
+          <a:xfrm>
+            <a:off x="11712388" y="6349004"/>
+            <a:ext cx="439271" cy="480110"/>
+          </a:xfrm>
+          <a:prstGeom prst="rect">
+            <a:avLst/>
+          </a:prstGeom>
+          <a:solidFill>
+            <a:schemeClr val="bg1"/>
+          </a:solidFill>
+          <a:ln>
+            <a:solidFill>
+              <a:schemeClr val="bg1"/>
+            </a:solidFill>
+          </a:ln>
+        </p:spPr>
+        <p:style>
+          <a:lnRef idx="2">
+            <a:schemeClr val="accent1">
+              <a:shade val="15000"/>
+            </a:schemeClr>
+          </a:lnRef>
+          <a:fillRef idx="1">
+            <a:schemeClr val="accent1"/>
+          </a:fillRef>
+          <a:effectRef idx="0">
+            <a:schemeClr val="accent1"/>
+          </a:effectRef>
+          <a:fontRef idx="minor">
+            <a:schemeClr val="lt1"/>
+          </a:fontRef>
+        </p:style>
+        <p:txBody>
+          <a:bodyPr rtlCol="0" anchor="ctr"/>
+          <a:lstStyle/>
+          <a:p>
+            <a:pPr algn="ctr"/>
+            <a:r>
+              <a:rPr lang="pt-BR" sz="1200" dirty="0">
+                <a:solidFill>
+                  <a:schemeClr val="tx1"/>
+                </a:solidFill>
+              </a:rPr>
+              <a:t>26</a:t>
             </a:r>
           </a:p>
         </p:txBody>
@@ -11874,6 +12525,16 @@
           </a:p>
           <a:p>
             <a:pPr lvl="1" algn="just"/>
+            <a:endParaRPr lang="pt-BR" dirty="0"/>
+          </a:p>
+          <a:p>
+            <a:pPr marL="457200" lvl="1" indent="0" algn="just">
+              <a:buNone/>
+            </a:pPr>
+            <a:endParaRPr lang="pt-BR" dirty="0"/>
+          </a:p>
+          <a:p>
+            <a:pPr lvl="1" algn="just"/>
             <a:r>
               <a:rPr lang="pt-BR" dirty="0" err="1"/>
               <a:t>Algorítmos</a:t>
@@ -12056,6 +12717,108 @@
           </a:prstGeom>
         </p:spPr>
       </p:pic>
+      <p:sp>
+        <p:nvSpPr>
+          <p:cNvPr id="6" name="Retângulo 5">
+            <a:extLst>
+              <a:ext uri="{FF2B5EF4-FFF2-40B4-BE49-F238E27FC236}">
+                <a16:creationId xmlns:a16="http://schemas.microsoft.com/office/drawing/2014/main" id="{BC3CB1AD-AA84-DF24-D018-25F142D08F42}"/>
+              </a:ext>
+            </a:extLst>
+          </p:cNvPr>
+          <p:cNvSpPr/>
+          <p:nvPr/>
+        </p:nvSpPr>
+        <p:spPr>
+          <a:xfrm>
+            <a:off x="11712388" y="6349004"/>
+            <a:ext cx="439271" cy="480110"/>
+          </a:xfrm>
+          <a:prstGeom prst="rect">
+            <a:avLst/>
+          </a:prstGeom>
+          <a:solidFill>
+            <a:schemeClr val="bg1"/>
+          </a:solidFill>
+          <a:ln>
+            <a:solidFill>
+              <a:schemeClr val="bg1"/>
+            </a:solidFill>
+          </a:ln>
+        </p:spPr>
+        <p:style>
+          <a:lnRef idx="2">
+            <a:schemeClr val="accent1">
+              <a:shade val="15000"/>
+            </a:schemeClr>
+          </a:lnRef>
+          <a:fillRef idx="1">
+            <a:schemeClr val="accent1"/>
+          </a:fillRef>
+          <a:effectRef idx="0">
+            <a:schemeClr val="accent1"/>
+          </a:effectRef>
+          <a:fontRef idx="minor">
+            <a:schemeClr val="lt1"/>
+          </a:fontRef>
+        </p:style>
+        <p:txBody>
+          <a:bodyPr rtlCol="0" anchor="ctr"/>
+          <a:lstStyle/>
+          <a:p>
+            <a:pPr algn="ctr"/>
+            <a:r>
+              <a:rPr lang="pt-BR" sz="1200" dirty="0">
+                <a:solidFill>
+                  <a:schemeClr val="tx1"/>
+                </a:solidFill>
+              </a:rPr>
+              <a:t>3</a:t>
+            </a:r>
+          </a:p>
+        </p:txBody>
+      </p:sp>
+      <p:cxnSp>
+        <p:nvCxnSpPr>
+          <p:cNvPr id="8" name="Conector de Seta Reta 7">
+            <a:extLst>
+              <a:ext uri="{FF2B5EF4-FFF2-40B4-BE49-F238E27FC236}">
+                <a16:creationId xmlns:a16="http://schemas.microsoft.com/office/drawing/2014/main" id="{E149FE77-7983-E9CB-7760-97B18D213BA6}"/>
+              </a:ext>
+            </a:extLst>
+          </p:cNvPr>
+          <p:cNvCxnSpPr>
+            <a:cxnSpLocks/>
+          </p:cNvCxnSpPr>
+          <p:nvPr/>
+        </p:nvCxnSpPr>
+        <p:spPr>
+          <a:xfrm>
+            <a:off x="2602854" y="3162300"/>
+            <a:ext cx="0" cy="533400"/>
+          </a:xfrm>
+          <a:prstGeom prst="straightConnector1">
+            <a:avLst/>
+          </a:prstGeom>
+          <a:ln w="38100">
+            <a:tailEnd type="triangle"/>
+          </a:ln>
+        </p:spPr>
+        <p:style>
+          <a:lnRef idx="1">
+            <a:schemeClr val="dk1"/>
+          </a:lnRef>
+          <a:fillRef idx="0">
+            <a:schemeClr val="dk1"/>
+          </a:fillRef>
+          <a:effectRef idx="0">
+            <a:schemeClr val="dk1"/>
+          </a:effectRef>
+          <a:fontRef idx="minor">
+            <a:schemeClr val="tx1"/>
+          </a:fontRef>
+        </p:style>
+      </p:cxnSp>
     </p:spTree>
     <p:extLst>
       <p:ext uri="{BB962C8B-B14F-4D97-AF65-F5344CB8AC3E}">
@@ -12302,7 +13065,7 @@
         </p:blipFill>
         <p:spPr bwMode="auto">
           <a:xfrm>
-            <a:off x="5042508" y="1574402"/>
+            <a:off x="5042508" y="1583367"/>
             <a:ext cx="6557964" cy="4918473"/>
           </a:xfrm>
           <a:prstGeom prst="rect">
@@ -12320,6 +13083,67 @@
           </a:extLst>
         </p:spPr>
       </p:pic>
+      <p:sp>
+        <p:nvSpPr>
+          <p:cNvPr id="6" name="Retângulo 5">
+            <a:extLst>
+              <a:ext uri="{FF2B5EF4-FFF2-40B4-BE49-F238E27FC236}">
+                <a16:creationId xmlns:a16="http://schemas.microsoft.com/office/drawing/2014/main" id="{B29FB942-BA90-794E-57BA-5B1A77A153B0}"/>
+              </a:ext>
+            </a:extLst>
+          </p:cNvPr>
+          <p:cNvSpPr/>
+          <p:nvPr/>
+        </p:nvSpPr>
+        <p:spPr>
+          <a:xfrm>
+            <a:off x="11712388" y="6349004"/>
+            <a:ext cx="439271" cy="480110"/>
+          </a:xfrm>
+          <a:prstGeom prst="rect">
+            <a:avLst/>
+          </a:prstGeom>
+          <a:solidFill>
+            <a:schemeClr val="bg1"/>
+          </a:solidFill>
+          <a:ln>
+            <a:solidFill>
+              <a:schemeClr val="bg1"/>
+            </a:solidFill>
+          </a:ln>
+        </p:spPr>
+        <p:style>
+          <a:lnRef idx="2">
+            <a:schemeClr val="accent1">
+              <a:shade val="15000"/>
+            </a:schemeClr>
+          </a:lnRef>
+          <a:fillRef idx="1">
+            <a:schemeClr val="accent1"/>
+          </a:fillRef>
+          <a:effectRef idx="0">
+            <a:schemeClr val="accent1"/>
+          </a:effectRef>
+          <a:fontRef idx="minor">
+            <a:schemeClr val="lt1"/>
+          </a:fontRef>
+        </p:style>
+        <p:txBody>
+          <a:bodyPr rtlCol="0" anchor="ctr"/>
+          <a:lstStyle/>
+          <a:p>
+            <a:pPr algn="ctr"/>
+            <a:r>
+              <a:rPr lang="pt-BR" sz="1200" dirty="0">
+                <a:solidFill>
+                  <a:schemeClr val="tx1"/>
+                </a:solidFill>
+              </a:rPr>
+              <a:t>4</a:t>
+            </a:r>
+          </a:p>
+        </p:txBody>
+      </p:sp>
     </p:spTree>
     <p:extLst>
       <p:ext uri="{BB962C8B-B14F-4D97-AF65-F5344CB8AC3E}">
@@ -12444,17 +13268,17 @@
             </a:r>
           </a:p>
           <a:p>
-            <a:pPr lvl="1" algn="just"/>
-            <a:r>
-              <a:rPr lang="pt-BR" dirty="0"/>
-              <a:t>Caracterização do problema de particionamento como uma questão de determinação da quantidade de clusters ideal</a:t>
-            </a:r>
-          </a:p>
-          <a:p>
             <a:pPr marL="457200" lvl="1" indent="0" algn="just">
               <a:buNone/>
             </a:pPr>
             <a:endParaRPr lang="pt-BR" dirty="0"/>
+          </a:p>
+          <a:p>
+            <a:pPr algn="just"/>
+            <a:r>
+              <a:rPr lang="pt-BR" dirty="0"/>
+              <a:t>Motivação</a:t>
+            </a:r>
           </a:p>
         </p:txBody>
       </p:sp>
@@ -12597,6 +13421,67 @@
           </a:extLst>
         </p:spPr>
       </p:pic>
+      <p:sp>
+        <p:nvSpPr>
+          <p:cNvPr id="6" name="Retângulo 5">
+            <a:extLst>
+              <a:ext uri="{FF2B5EF4-FFF2-40B4-BE49-F238E27FC236}">
+                <a16:creationId xmlns:a16="http://schemas.microsoft.com/office/drawing/2014/main" id="{120C8D69-8C2F-ACB9-BDC9-9A28C1CB3B33}"/>
+              </a:ext>
+            </a:extLst>
+          </p:cNvPr>
+          <p:cNvSpPr/>
+          <p:nvPr/>
+        </p:nvSpPr>
+        <p:spPr>
+          <a:xfrm>
+            <a:off x="11712388" y="6349004"/>
+            <a:ext cx="439271" cy="480110"/>
+          </a:xfrm>
+          <a:prstGeom prst="rect">
+            <a:avLst/>
+          </a:prstGeom>
+          <a:solidFill>
+            <a:schemeClr val="bg1"/>
+          </a:solidFill>
+          <a:ln>
+            <a:solidFill>
+              <a:schemeClr val="bg1"/>
+            </a:solidFill>
+          </a:ln>
+        </p:spPr>
+        <p:style>
+          <a:lnRef idx="2">
+            <a:schemeClr val="accent1">
+              <a:shade val="15000"/>
+            </a:schemeClr>
+          </a:lnRef>
+          <a:fillRef idx="1">
+            <a:schemeClr val="accent1"/>
+          </a:fillRef>
+          <a:effectRef idx="0">
+            <a:schemeClr val="accent1"/>
+          </a:effectRef>
+          <a:fontRef idx="minor">
+            <a:schemeClr val="lt1"/>
+          </a:fontRef>
+        </p:style>
+        <p:txBody>
+          <a:bodyPr rtlCol="0" anchor="ctr"/>
+          <a:lstStyle/>
+          <a:p>
+            <a:pPr algn="ctr"/>
+            <a:r>
+              <a:rPr lang="pt-BR" sz="1200" dirty="0">
+                <a:solidFill>
+                  <a:schemeClr val="tx1"/>
+                </a:solidFill>
+              </a:rPr>
+              <a:t>5</a:t>
+            </a:r>
+          </a:p>
+        </p:txBody>
+      </p:sp>
     </p:spTree>
     <p:extLst>
       <p:ext uri="{BB962C8B-B14F-4D97-AF65-F5344CB8AC3E}">
@@ -12650,7 +13535,7 @@
           <a:p>
             <a:r>
               <a:rPr lang="pt-BR" dirty="0"/>
-              <a:t>Introdução</a:t>
+              <a:t>Objetivo</a:t>
             </a:r>
           </a:p>
         </p:txBody>
@@ -12674,58 +13559,36 @@
         <p:spPr>
           <a:xfrm>
             <a:off x="838200" y="1825625"/>
-            <a:ext cx="8153400" cy="4351338"/>
+            <a:ext cx="8639630" cy="4003675"/>
           </a:xfrm>
         </p:spPr>
         <p:txBody>
           <a:bodyPr/>
           <a:lstStyle/>
           <a:p>
-            <a:r>
-              <a:rPr lang="pt-BR" dirty="0"/>
-              <a:t>Estudos prévios</a:t>
-            </a:r>
-          </a:p>
-          <a:p>
-            <a:pPr marL="457200" lvl="1" indent="0">
-              <a:buNone/>
-            </a:pPr>
+            <a:pPr algn="just"/>
+            <a:r>
+              <a:rPr lang="pt-BR" dirty="0"/>
+              <a:t>Avaliar efetivamente os resultados de agrupamento de múltiplos tipos de conjuntos de dados (Estruturas lineares, múltiplas, anulares e convexas)</a:t>
+            </a:r>
+          </a:p>
+          <a:p>
+            <a:pPr algn="just"/>
             <a:endParaRPr lang="pt-BR" dirty="0"/>
           </a:p>
           <a:p>
-            <a:pPr lvl="1"/>
-            <a:r>
-              <a:rPr lang="pt-BR" dirty="0"/>
-              <a:t>Conjunto de partições estendidas</a:t>
-            </a:r>
-          </a:p>
-          <a:p>
-            <a:pPr lvl="1"/>
-            <a:r>
-              <a:rPr lang="pt-BR" dirty="0"/>
-              <a:t>Proposta de novo agrupamento hierárquico</a:t>
-            </a:r>
-          </a:p>
-          <a:p>
-            <a:pPr lvl="1"/>
-            <a:r>
-              <a:rPr lang="pt-BR" dirty="0"/>
-              <a:t>Proposta de um novo índice de validade de cluster</a:t>
-            </a:r>
-          </a:p>
-          <a:p>
-            <a:pPr lvl="1"/>
-            <a:endParaRPr lang="pt-BR" dirty="0"/>
-          </a:p>
-          <a:p>
-            <a:pPr lvl="1"/>
-            <a:endParaRPr lang="pt-BR" dirty="0"/>
-          </a:p>
-          <a:p>
-            <a:pPr lvl="1"/>
-            <a:r>
-              <a:rPr lang="pt-BR" dirty="0"/>
-              <a:t>Resultados obtidos</a:t>
+            <a:pPr algn="just"/>
+            <a:r>
+              <a:rPr lang="pt-BR" dirty="0"/>
+              <a:t>Definição de um novo índice de validade de agrupamento a ser utilizado para determinar o número ideal de clusters, utilizando como base o algoritmo de Agrupamento hierárquico </a:t>
+            </a:r>
+            <a:r>
+              <a:rPr lang="pt-BR" dirty="0" err="1"/>
+              <a:t>aglomerativo</a:t>
+            </a:r>
+            <a:r>
+              <a:rPr lang="pt-BR" dirty="0"/>
+              <a:t> (AHC)</a:t>
             </a:r>
           </a:p>
         </p:txBody>
@@ -12799,250 +13662,6 @@
               </a:ext>
             </a:extLst>
           </a:blip>
-          <a:srcRect l="18938"/>
-          <a:stretch/>
-        </p:blipFill>
-        <p:spPr bwMode="auto">
-          <a:xfrm>
-            <a:off x="259976" y="5469467"/>
-            <a:ext cx="2762759" cy="1388533"/>
-          </a:xfrm>
-          <a:prstGeom prst="rect">
-            <a:avLst/>
-          </a:prstGeom>
-          <a:noFill/>
-          <a:extLst>
-            <a:ext uri="{909E8E84-426E-40DD-AFC4-6F175D3DCCD1}">
-              <a14:hiddenFill xmlns:a14="http://schemas.microsoft.com/office/drawing/2010/main">
-                <a:solidFill>
-                  <a:srgbClr val="FFFFFF"/>
-                </a:solidFill>
-              </a14:hiddenFill>
-            </a:ext>
-          </a:extLst>
-        </p:spPr>
-      </p:pic>
-      <p:cxnSp>
-        <p:nvCxnSpPr>
-          <p:cNvPr id="7" name="Conector de Seta Reta 6">
-            <a:extLst>
-              <a:ext uri="{FF2B5EF4-FFF2-40B4-BE49-F238E27FC236}">
-                <a16:creationId xmlns:a16="http://schemas.microsoft.com/office/drawing/2014/main" id="{A96DFAB7-D731-DB4E-0CF5-378A477BBB7B}"/>
-              </a:ext>
-            </a:extLst>
-          </p:cNvPr>
-          <p:cNvCxnSpPr>
-            <a:cxnSpLocks/>
-          </p:cNvCxnSpPr>
-          <p:nvPr/>
-        </p:nvCxnSpPr>
-        <p:spPr>
-          <a:xfrm>
-            <a:off x="2184400" y="4000500"/>
-            <a:ext cx="0" cy="533400"/>
-          </a:xfrm>
-          <a:prstGeom prst="straightConnector1">
-            <a:avLst/>
-          </a:prstGeom>
-          <a:ln w="38100">
-            <a:tailEnd type="triangle"/>
-          </a:ln>
-        </p:spPr>
-        <p:style>
-          <a:lnRef idx="1">
-            <a:schemeClr val="dk1"/>
-          </a:lnRef>
-          <a:fillRef idx="0">
-            <a:schemeClr val="dk1"/>
-          </a:fillRef>
-          <a:effectRef idx="0">
-            <a:schemeClr val="dk1"/>
-          </a:effectRef>
-          <a:fontRef idx="minor">
-            <a:schemeClr val="tx1"/>
-          </a:fontRef>
-        </p:style>
-      </p:cxnSp>
-    </p:spTree>
-    <p:extLst>
-      <p:ext uri="{BB962C8B-B14F-4D97-AF65-F5344CB8AC3E}">
-        <p14:creationId xmlns:p14="http://schemas.microsoft.com/office/powerpoint/2010/main" val="1177983384"/>
-      </p:ext>
-    </p:extLst>
-  </p:cSld>
-  <p:clrMapOvr>
-    <a:masterClrMapping/>
-  </p:clrMapOvr>
-</p:sld>
-</file>
-
-<file path=ppt/slides/slide7.xml><?xml version="1.0" encoding="utf-8"?>
-<p:sld xmlns:a="http://schemas.openxmlformats.org/drawingml/2006/main" xmlns:r="http://schemas.openxmlformats.org/officeDocument/2006/relationships" xmlns:p="http://schemas.openxmlformats.org/presentationml/2006/main">
-  <p:cSld>
-    <p:spTree>
-      <p:nvGrpSpPr>
-        <p:cNvPr id="1" name=""/>
-        <p:cNvGrpSpPr/>
-        <p:nvPr/>
-      </p:nvGrpSpPr>
-      <p:grpSpPr>
-        <a:xfrm>
-          <a:off x="0" y="0"/>
-          <a:ext cx="0" cy="0"/>
-          <a:chOff x="0" y="0"/>
-          <a:chExt cx="0" cy="0"/>
-        </a:xfrm>
-      </p:grpSpPr>
-      <p:sp>
-        <p:nvSpPr>
-          <p:cNvPr id="2" name="Título 1">
-            <a:extLst>
-              <a:ext uri="{FF2B5EF4-FFF2-40B4-BE49-F238E27FC236}">
-                <a16:creationId xmlns:a16="http://schemas.microsoft.com/office/drawing/2014/main" id="{4549A9CF-9A04-0D0B-3F38-47569BAC879F}"/>
-              </a:ext>
-            </a:extLst>
-          </p:cNvPr>
-          <p:cNvSpPr>
-            <a:spLocks noGrp="1"/>
-          </p:cNvSpPr>
-          <p:nvPr>
-            <p:ph type="title"/>
-          </p:nvPr>
-        </p:nvSpPr>
-        <p:spPr/>
-        <p:txBody>
-          <a:bodyPr/>
-          <a:lstStyle/>
-          <a:p>
-            <a:r>
-              <a:rPr lang="pt-BR" dirty="0"/>
-              <a:t>Objetivo</a:t>
-            </a:r>
-          </a:p>
-        </p:txBody>
-      </p:sp>
-      <p:sp>
-        <p:nvSpPr>
-          <p:cNvPr id="3" name="Espaço Reservado para Conteúdo 2">
-            <a:extLst>
-              <a:ext uri="{FF2B5EF4-FFF2-40B4-BE49-F238E27FC236}">
-                <a16:creationId xmlns:a16="http://schemas.microsoft.com/office/drawing/2014/main" id="{EC2E1DDA-B549-8F9D-BA64-18BAFB4D49A1}"/>
-              </a:ext>
-            </a:extLst>
-          </p:cNvPr>
-          <p:cNvSpPr>
-            <a:spLocks noGrp="1"/>
-          </p:cNvSpPr>
-          <p:nvPr>
-            <p:ph idx="1"/>
-          </p:nvPr>
-        </p:nvSpPr>
-        <p:spPr>
-          <a:xfrm>
-            <a:off x="838200" y="1825625"/>
-            <a:ext cx="8639630" cy="4003675"/>
-          </a:xfrm>
-        </p:spPr>
-        <p:txBody>
-          <a:bodyPr/>
-          <a:lstStyle/>
-          <a:p>
-            <a:pPr algn="just"/>
-            <a:r>
-              <a:rPr lang="pt-BR" dirty="0"/>
-              <a:t>Avaliar efetivamente os resultados de agrupamento de múltiplos tipos de conjuntos de dados (Estruturas lineares, múltiplas, anulares e convexas)</a:t>
-            </a:r>
-          </a:p>
-          <a:p>
-            <a:pPr algn="just"/>
-            <a:endParaRPr lang="pt-BR" dirty="0"/>
-          </a:p>
-          <a:p>
-            <a:pPr algn="just"/>
-            <a:r>
-              <a:rPr lang="pt-BR" dirty="0"/>
-              <a:t>Definição de um novo índice de validade de agrupamento a ser utilizado para determinar o número ideal de clusters, utilizando como base o algoritmo de Agrupamento hierárquico </a:t>
-            </a:r>
-            <a:r>
-              <a:rPr lang="pt-BR" dirty="0" err="1"/>
-              <a:t>aglomerativo</a:t>
-            </a:r>
-            <a:r>
-              <a:rPr lang="pt-BR" dirty="0"/>
-              <a:t> (AHC)</a:t>
-            </a:r>
-          </a:p>
-        </p:txBody>
-      </p:sp>
-      <p:pic>
-        <p:nvPicPr>
-          <p:cNvPr id="4" name="Picture 2" descr="Local do Evento | SBRC 2021 - Simpósio Brasileiro de Redes ...">
-            <a:extLst>
-              <a:ext uri="{FF2B5EF4-FFF2-40B4-BE49-F238E27FC236}">
-                <a16:creationId xmlns:a16="http://schemas.microsoft.com/office/drawing/2014/main" id="{C4BAF076-983A-267F-65B0-779489FA3886}"/>
-              </a:ext>
-            </a:extLst>
-          </p:cNvPr>
-          <p:cNvPicPr>
-            <a:picLocks noChangeAspect="1" noChangeArrowheads="1"/>
-          </p:cNvPicPr>
-          <p:nvPr/>
-        </p:nvPicPr>
-        <p:blipFill>
-          <a:blip r:embed="rId3">
-            <a:extLst>
-              <a:ext uri="{28A0092B-C50C-407E-A947-70E740481C1C}">
-                <a14:useLocalDpi xmlns:a14="http://schemas.microsoft.com/office/drawing/2010/main" val="0"/>
-              </a:ext>
-            </a:extLst>
-          </a:blip>
-          <a:srcRect/>
-          <a:stretch>
-            <a:fillRect/>
-          </a:stretch>
-        </p:blipFill>
-        <p:spPr bwMode="auto">
-          <a:xfrm>
-            <a:off x="8783783" y="0"/>
-            <a:ext cx="3408217" cy="1388533"/>
-          </a:xfrm>
-          <a:prstGeom prst="rect">
-            <a:avLst/>
-          </a:prstGeom>
-          <a:noFill/>
-          <a:extLst>
-            <a:ext uri="{909E8E84-426E-40DD-AFC4-6F175D3DCCD1}">
-              <a14:hiddenFill xmlns:a14="http://schemas.microsoft.com/office/drawing/2010/main">
-                <a:solidFill>
-                  <a:srgbClr val="FFFFFF"/>
-                </a:solidFill>
-              </a14:hiddenFill>
-            </a:ext>
-          </a:extLst>
-        </p:spPr>
-      </p:pic>
-      <p:pic>
-        <p:nvPicPr>
-          <p:cNvPr id="5" name="Picture 4" descr="Edições Anteriores | SBRC 2021 - Simpósio Brasileiro de Redes de  Computadores e Sistemas Distribuídos">
-            <a:extLst>
-              <a:ext uri="{FF2B5EF4-FFF2-40B4-BE49-F238E27FC236}">
-                <a16:creationId xmlns:a16="http://schemas.microsoft.com/office/drawing/2014/main" id="{EE629CB4-DE61-E1C8-0777-7BFAD2ACB3C1}"/>
-              </a:ext>
-            </a:extLst>
-          </p:cNvPr>
-          <p:cNvPicPr>
-            <a:picLocks noChangeAspect="1" noChangeArrowheads="1"/>
-          </p:cNvPicPr>
-          <p:nvPr/>
-        </p:nvPicPr>
-        <p:blipFill rotWithShape="1">
-          <a:blip r:embed="rId4">
-            <a:extLst>
-              <a:ext uri="{28A0092B-C50C-407E-A947-70E740481C1C}">
-                <a14:useLocalDpi xmlns:a14="http://schemas.microsoft.com/office/drawing/2010/main" val="0"/>
-              </a:ext>
-            </a:extLst>
-          </a:blip>
           <a:srcRect l="18938" t="25915"/>
           <a:stretch/>
         </p:blipFill>
@@ -13066,6 +13685,67 @@
           </a:extLst>
         </p:spPr>
       </p:pic>
+      <p:sp>
+        <p:nvSpPr>
+          <p:cNvPr id="6" name="Retângulo 5">
+            <a:extLst>
+              <a:ext uri="{FF2B5EF4-FFF2-40B4-BE49-F238E27FC236}">
+                <a16:creationId xmlns:a16="http://schemas.microsoft.com/office/drawing/2014/main" id="{E1097071-E711-3197-D2BF-B56E7FBD29DC}"/>
+              </a:ext>
+            </a:extLst>
+          </p:cNvPr>
+          <p:cNvSpPr/>
+          <p:nvPr/>
+        </p:nvSpPr>
+        <p:spPr>
+          <a:xfrm>
+            <a:off x="11712388" y="6349004"/>
+            <a:ext cx="439271" cy="480110"/>
+          </a:xfrm>
+          <a:prstGeom prst="rect">
+            <a:avLst/>
+          </a:prstGeom>
+          <a:solidFill>
+            <a:schemeClr val="bg1"/>
+          </a:solidFill>
+          <a:ln>
+            <a:solidFill>
+              <a:schemeClr val="bg1"/>
+            </a:solidFill>
+          </a:ln>
+        </p:spPr>
+        <p:style>
+          <a:lnRef idx="2">
+            <a:schemeClr val="accent1">
+              <a:shade val="15000"/>
+            </a:schemeClr>
+          </a:lnRef>
+          <a:fillRef idx="1">
+            <a:schemeClr val="accent1"/>
+          </a:fillRef>
+          <a:effectRef idx="0">
+            <a:schemeClr val="accent1"/>
+          </a:effectRef>
+          <a:fontRef idx="minor">
+            <a:schemeClr val="lt1"/>
+          </a:fontRef>
+        </p:style>
+        <p:txBody>
+          <a:bodyPr rtlCol="0" anchor="ctr"/>
+          <a:lstStyle/>
+          <a:p>
+            <a:pPr algn="ctr"/>
+            <a:r>
+              <a:rPr lang="pt-BR" sz="1200" dirty="0">
+                <a:solidFill>
+                  <a:schemeClr val="tx1"/>
+                </a:solidFill>
+              </a:rPr>
+              <a:t>7</a:t>
+            </a:r>
+          </a:p>
+        </p:txBody>
+      </p:sp>
     </p:spTree>
     <p:extLst>
       <p:ext uri="{BB962C8B-B14F-4D97-AF65-F5344CB8AC3E}">
@@ -13079,7 +13759,7 @@
 </p:sld>
 </file>
 
-<file path=ppt/slides/slide8.xml><?xml version="1.0" encoding="utf-8"?>
+<file path=ppt/slides/slide7.xml><?xml version="1.0" encoding="utf-8"?>
 <p:sld xmlns:a="http://schemas.openxmlformats.org/drawingml/2006/main" xmlns:r="http://schemas.openxmlformats.org/officeDocument/2006/relationships" xmlns:p="http://schemas.openxmlformats.org/presentationml/2006/main">
   <p:cSld>
     <p:spTree>
@@ -13461,6 +14141,67 @@
           </a:fontRef>
         </p:style>
       </p:cxnSp>
+      <p:sp>
+        <p:nvSpPr>
+          <p:cNvPr id="6" name="Retângulo 5">
+            <a:extLst>
+              <a:ext uri="{FF2B5EF4-FFF2-40B4-BE49-F238E27FC236}">
+                <a16:creationId xmlns:a16="http://schemas.microsoft.com/office/drawing/2014/main" id="{16C73D58-21F3-668F-A6D5-71411314BF62}"/>
+              </a:ext>
+            </a:extLst>
+          </p:cNvPr>
+          <p:cNvSpPr/>
+          <p:nvPr/>
+        </p:nvSpPr>
+        <p:spPr>
+          <a:xfrm>
+            <a:off x="11712388" y="6349004"/>
+            <a:ext cx="439271" cy="480110"/>
+          </a:xfrm>
+          <a:prstGeom prst="rect">
+            <a:avLst/>
+          </a:prstGeom>
+          <a:solidFill>
+            <a:schemeClr val="bg1"/>
+          </a:solidFill>
+          <a:ln>
+            <a:solidFill>
+              <a:schemeClr val="bg1"/>
+            </a:solidFill>
+          </a:ln>
+        </p:spPr>
+        <p:style>
+          <a:lnRef idx="2">
+            <a:schemeClr val="accent1">
+              <a:shade val="15000"/>
+            </a:schemeClr>
+          </a:lnRef>
+          <a:fillRef idx="1">
+            <a:schemeClr val="accent1"/>
+          </a:fillRef>
+          <a:effectRef idx="0">
+            <a:schemeClr val="accent1"/>
+          </a:effectRef>
+          <a:fontRef idx="minor">
+            <a:schemeClr val="lt1"/>
+          </a:fontRef>
+        </p:style>
+        <p:txBody>
+          <a:bodyPr rtlCol="0" anchor="ctr"/>
+          <a:lstStyle/>
+          <a:p>
+            <a:pPr algn="ctr"/>
+            <a:r>
+              <a:rPr lang="pt-BR" sz="1200" dirty="0">
+                <a:solidFill>
+                  <a:schemeClr val="tx1"/>
+                </a:solidFill>
+              </a:rPr>
+              <a:t>8</a:t>
+            </a:r>
+          </a:p>
+        </p:txBody>
+      </p:sp>
     </p:spTree>
     <p:extLst>
       <p:ext uri="{BB962C8B-B14F-4D97-AF65-F5344CB8AC3E}">
@@ -13474,7 +14215,7 @@
 </p:sld>
 </file>
 
-<file path=ppt/slides/slide9.xml><?xml version="1.0" encoding="utf-8"?>
+<file path=ppt/slides/slide8.xml><?xml version="1.0" encoding="utf-8"?>
 <p:sld xmlns:a="http://schemas.openxmlformats.org/drawingml/2006/main" xmlns:r="http://schemas.openxmlformats.org/officeDocument/2006/relationships" xmlns:p="http://schemas.openxmlformats.org/presentationml/2006/main">
   <p:cSld>
     <p:spTree>
@@ -13526,8 +14267,8 @@
           </a:p>
         </p:txBody>
       </p:sp>
-      <mc:AlternateContent xmlns:mc="http://schemas.openxmlformats.org/markup-compatibility/2006">
-        <mc:Choice xmlns:a14="http://schemas.microsoft.com/office/drawing/2010/main" Requires="a14">
+      <mc:AlternateContent xmlns:mc="http://schemas.openxmlformats.org/markup-compatibility/2006" xmlns:a14="http://schemas.microsoft.com/office/drawing/2010/main">
+        <mc:Choice Requires="a14">
           <p:sp>
             <p:nvSpPr>
               <p:cNvPr id="3" name="Espaço Reservado para Conteúdo 2">
@@ -13779,7 +14520,7 @@
             </p:txBody>
           </p:sp>
         </mc:Choice>
-        <mc:Fallback>
+        <mc:Fallback xmlns="">
           <p:sp>
             <p:nvSpPr>
               <p:cNvPr id="3" name="Espaço Reservado para Conteúdo 2">
@@ -14074,10 +14815,560 @@
           </a:fontRef>
         </p:style>
       </p:cxnSp>
+      <p:sp>
+        <p:nvSpPr>
+          <p:cNvPr id="6" name="Retângulo 5">
+            <a:extLst>
+              <a:ext uri="{FF2B5EF4-FFF2-40B4-BE49-F238E27FC236}">
+                <a16:creationId xmlns:a16="http://schemas.microsoft.com/office/drawing/2014/main" id="{47891142-5AD1-473C-D1AC-030F7B472686}"/>
+              </a:ext>
+            </a:extLst>
+          </p:cNvPr>
+          <p:cNvSpPr/>
+          <p:nvPr/>
+        </p:nvSpPr>
+        <p:spPr>
+          <a:xfrm>
+            <a:off x="11712388" y="6349004"/>
+            <a:ext cx="439271" cy="480110"/>
+          </a:xfrm>
+          <a:prstGeom prst="rect">
+            <a:avLst/>
+          </a:prstGeom>
+          <a:solidFill>
+            <a:schemeClr val="bg1"/>
+          </a:solidFill>
+          <a:ln>
+            <a:solidFill>
+              <a:schemeClr val="bg1"/>
+            </a:solidFill>
+          </a:ln>
+        </p:spPr>
+        <p:style>
+          <a:lnRef idx="2">
+            <a:schemeClr val="accent1">
+              <a:shade val="15000"/>
+            </a:schemeClr>
+          </a:lnRef>
+          <a:fillRef idx="1">
+            <a:schemeClr val="accent1"/>
+          </a:fillRef>
+          <a:effectRef idx="0">
+            <a:schemeClr val="accent1"/>
+          </a:effectRef>
+          <a:fontRef idx="minor">
+            <a:schemeClr val="lt1"/>
+          </a:fontRef>
+        </p:style>
+        <p:txBody>
+          <a:bodyPr rtlCol="0" anchor="ctr"/>
+          <a:lstStyle/>
+          <a:p>
+            <a:pPr algn="ctr"/>
+            <a:r>
+              <a:rPr lang="pt-BR" sz="1200" dirty="0">
+                <a:solidFill>
+                  <a:schemeClr val="tx1"/>
+                </a:solidFill>
+              </a:rPr>
+              <a:t>9</a:t>
+            </a:r>
+          </a:p>
+        </p:txBody>
+      </p:sp>
     </p:spTree>
     <p:extLst>
       <p:ext uri="{BB962C8B-B14F-4D97-AF65-F5344CB8AC3E}">
         <p14:creationId xmlns:p14="http://schemas.microsoft.com/office/powerpoint/2010/main" val="1315933892"/>
+      </p:ext>
+    </p:extLst>
+  </p:cSld>
+  <p:clrMapOvr>
+    <a:masterClrMapping/>
+  </p:clrMapOvr>
+</p:sld>
+</file>
+
+<file path=ppt/slides/slide9.xml><?xml version="1.0" encoding="utf-8"?>
+<p:sld xmlns:a="http://schemas.openxmlformats.org/drawingml/2006/main" xmlns:r="http://schemas.openxmlformats.org/officeDocument/2006/relationships" xmlns:p="http://schemas.openxmlformats.org/presentationml/2006/main">
+  <p:cSld>
+    <p:spTree>
+      <p:nvGrpSpPr>
+        <p:cNvPr id="1" name=""/>
+        <p:cNvGrpSpPr/>
+        <p:nvPr/>
+      </p:nvGrpSpPr>
+      <p:grpSpPr>
+        <a:xfrm>
+          <a:off x="0" y="0"/>
+          <a:ext cx="0" cy="0"/>
+          <a:chOff x="0" y="0"/>
+          <a:chExt cx="0" cy="0"/>
+        </a:xfrm>
+      </p:grpSpPr>
+      <p:sp>
+        <p:nvSpPr>
+          <p:cNvPr id="2" name="Título 1">
+            <a:extLst>
+              <a:ext uri="{FF2B5EF4-FFF2-40B4-BE49-F238E27FC236}">
+                <a16:creationId xmlns:a16="http://schemas.microsoft.com/office/drawing/2014/main" id="{4549A9CF-9A04-0D0B-3F38-47569BAC879F}"/>
+              </a:ext>
+            </a:extLst>
+          </p:cNvPr>
+          <p:cNvSpPr>
+            <a:spLocks noGrp="1"/>
+          </p:cNvSpPr>
+          <p:nvPr>
+            <p:ph type="title"/>
+          </p:nvPr>
+        </p:nvSpPr>
+        <p:spPr/>
+        <p:txBody>
+          <a:bodyPr/>
+          <a:lstStyle/>
+          <a:p>
+            <a:r>
+              <a:rPr lang="pt-BR" dirty="0"/>
+              <a:t>Índice de proporção de</a:t>
+            </a:r>
+            <a:br>
+              <a:rPr lang="pt-BR" dirty="0"/>
+            </a:br>
+            <a:r>
+              <a:rPr lang="pt-BR" dirty="0"/>
+              <a:t>compacidade separada (CSP)</a:t>
+            </a:r>
+          </a:p>
+        </p:txBody>
+      </p:sp>
+      <mc:AlternateContent xmlns:mc="http://schemas.openxmlformats.org/markup-compatibility/2006" xmlns:a14="http://schemas.microsoft.com/office/drawing/2010/main">
+        <mc:Choice Requires="a14">
+          <p:sp>
+            <p:nvSpPr>
+              <p:cNvPr id="3" name="Espaço Reservado para Conteúdo 2">
+                <a:extLst>
+                  <a:ext uri="{FF2B5EF4-FFF2-40B4-BE49-F238E27FC236}">
+                    <a16:creationId xmlns:a16="http://schemas.microsoft.com/office/drawing/2014/main" id="{EC2E1DDA-B549-8F9D-BA64-18BAFB4D49A1}"/>
+                  </a:ext>
+                </a:extLst>
+              </p:cNvPr>
+              <p:cNvSpPr>
+                <a:spLocks noGrp="1"/>
+              </p:cNvSpPr>
+              <p:nvPr>
+                <p:ph idx="1"/>
+              </p:nvPr>
+            </p:nvSpPr>
+            <p:spPr>
+              <a:xfrm>
+                <a:off x="838200" y="2045859"/>
+                <a:ext cx="9791701" cy="4117874"/>
+              </a:xfrm>
+            </p:spPr>
+            <p:txBody>
+              <a:bodyPr>
+                <a:normAutofit/>
+              </a:bodyPr>
+              <a:lstStyle/>
+              <a:p>
+                <a:r>
+                  <a:rPr lang="pt-BR" dirty="0"/>
+                  <a:t>Definição 2</a:t>
+                </a:r>
+              </a:p>
+              <a:p>
+                <a:pPr lvl="1" algn="just"/>
+                <a:endParaRPr lang="pt-BR" dirty="0"/>
+              </a:p>
+              <a:p>
+                <a:pPr lvl="1" algn="just"/>
+                <a:r>
+                  <a:rPr lang="pt-BR" dirty="0"/>
+                  <a:t>Tomamos o valor mínimo das distâncias mínimas entre as amostras no cluster eu e as amostras em outros clusters como a separação entre clusters </a:t>
+                </a:r>
+                <a14:m>
+                  <m:oMath xmlns:m="http://schemas.openxmlformats.org/officeDocument/2006/math">
+                    <m:r>
+                      <a:rPr lang="pt-BR" b="0" i="1" smtClean="0">
+                        <a:latin typeface="Cambria Math" panose="02040503050406030204" pitchFamily="18" charset="0"/>
+                      </a:rPr>
+                      <m:t>𝑠𝑑</m:t>
+                    </m:r>
+                    <m:d>
+                      <m:dPr>
+                        <m:ctrlPr>
+                          <a:rPr lang="pt-BR" b="0" i="1" smtClean="0">
+                            <a:latin typeface="Cambria Math" panose="02040503050406030204" pitchFamily="18" charset="0"/>
+                          </a:rPr>
+                        </m:ctrlPr>
+                      </m:dPr>
+                      <m:e>
+                        <m:r>
+                          <a:rPr lang="pt-BR" b="0" i="1" smtClean="0">
+                            <a:latin typeface="Cambria Math" panose="02040503050406030204" pitchFamily="18" charset="0"/>
+                          </a:rPr>
+                          <m:t>𝑖</m:t>
+                        </m:r>
+                      </m:e>
+                    </m:d>
+                  </m:oMath>
+                </a14:m>
+                <a:r>
+                  <a:rPr lang="pt-BR" dirty="0"/>
+                  <a:t>, que é definido da seguinte forma: </a:t>
+                </a:r>
+              </a:p>
+            </p:txBody>
+          </p:sp>
+        </mc:Choice>
+        <mc:Fallback xmlns="">
+          <p:sp>
+            <p:nvSpPr>
+              <p:cNvPr id="3" name="Espaço Reservado para Conteúdo 2">
+                <a:extLst>
+                  <a:ext uri="{FF2B5EF4-FFF2-40B4-BE49-F238E27FC236}">
+                    <a16:creationId xmlns:a16="http://schemas.microsoft.com/office/drawing/2014/main" id="{EC2E1DDA-B549-8F9D-BA64-18BAFB4D49A1}"/>
+                  </a:ext>
+                </a:extLst>
+              </p:cNvPr>
+              <p:cNvSpPr>
+                <a:spLocks noGrp="1" noRot="1" noChangeAspect="1" noMove="1" noResize="1" noEditPoints="1" noAdjustHandles="1" noChangeArrowheads="1" noChangeShapeType="1" noTextEdit="1"/>
+              </p:cNvSpPr>
+              <p:nvPr>
+                <p:ph idx="1"/>
+              </p:nvPr>
+            </p:nvSpPr>
+            <p:spPr>
+              <a:xfrm>
+                <a:off x="838200" y="2045859"/>
+                <a:ext cx="9791701" cy="4117874"/>
+              </a:xfrm>
+              <a:blipFill>
+                <a:blip r:embed="rId3"/>
+                <a:stretch>
+                  <a:fillRect l="-1121" t="-2519" r="-934"/>
+                </a:stretch>
+              </a:blipFill>
+            </p:spPr>
+            <p:txBody>
+              <a:bodyPr/>
+              <a:lstStyle/>
+              <a:p>
+                <a:r>
+                  <a:rPr lang="pt-BR">
+                    <a:noFill/>
+                  </a:rPr>
+                  <a:t> </a:t>
+                </a:r>
+              </a:p>
+            </p:txBody>
+          </p:sp>
+        </mc:Fallback>
+      </mc:AlternateContent>
+      <p:pic>
+        <p:nvPicPr>
+          <p:cNvPr id="4" name="Picture 2" descr="Local do Evento | SBRC 2021 - Simpósio Brasileiro de Redes ...">
+            <a:extLst>
+              <a:ext uri="{FF2B5EF4-FFF2-40B4-BE49-F238E27FC236}">
+                <a16:creationId xmlns:a16="http://schemas.microsoft.com/office/drawing/2014/main" id="{C4BAF076-983A-267F-65B0-779489FA3886}"/>
+              </a:ext>
+            </a:extLst>
+          </p:cNvPr>
+          <p:cNvPicPr>
+            <a:picLocks noChangeAspect="1" noChangeArrowheads="1"/>
+          </p:cNvPicPr>
+          <p:nvPr/>
+        </p:nvPicPr>
+        <p:blipFill>
+          <a:blip r:embed="rId4">
+            <a:extLst>
+              <a:ext uri="{28A0092B-C50C-407E-A947-70E740481C1C}">
+                <a14:useLocalDpi xmlns:a14="http://schemas.microsoft.com/office/drawing/2010/main" val="0"/>
+              </a:ext>
+            </a:extLst>
+          </a:blip>
+          <a:srcRect/>
+          <a:stretch>
+            <a:fillRect/>
+          </a:stretch>
+        </p:blipFill>
+        <p:spPr bwMode="auto">
+          <a:xfrm>
+            <a:off x="8783783" y="0"/>
+            <a:ext cx="3408217" cy="1388533"/>
+          </a:xfrm>
+          <a:prstGeom prst="rect">
+            <a:avLst/>
+          </a:prstGeom>
+          <a:noFill/>
+          <a:extLst>
+            <a:ext uri="{909E8E84-426E-40DD-AFC4-6F175D3DCCD1}">
+              <a14:hiddenFill xmlns:a14="http://schemas.microsoft.com/office/drawing/2010/main">
+                <a:solidFill>
+                  <a:srgbClr val="FFFFFF"/>
+                </a:solidFill>
+              </a14:hiddenFill>
+            </a:ext>
+          </a:extLst>
+        </p:spPr>
+      </p:pic>
+      <p:pic>
+        <p:nvPicPr>
+          <p:cNvPr id="5" name="Picture 4" descr="Edições Anteriores | SBRC 2021 - Simpósio Brasileiro de Redes de  Computadores e Sistemas Distribuídos">
+            <a:extLst>
+              <a:ext uri="{FF2B5EF4-FFF2-40B4-BE49-F238E27FC236}">
+                <a16:creationId xmlns:a16="http://schemas.microsoft.com/office/drawing/2014/main" id="{EE629CB4-DE61-E1C8-0777-7BFAD2ACB3C1}"/>
+              </a:ext>
+            </a:extLst>
+          </p:cNvPr>
+          <p:cNvPicPr>
+            <a:picLocks noChangeAspect="1" noChangeArrowheads="1"/>
+          </p:cNvPicPr>
+          <p:nvPr/>
+        </p:nvPicPr>
+        <p:blipFill rotWithShape="1">
+          <a:blip r:embed="rId5">
+            <a:extLst>
+              <a:ext uri="{28A0092B-C50C-407E-A947-70E740481C1C}">
+                <a14:useLocalDpi xmlns:a14="http://schemas.microsoft.com/office/drawing/2010/main" val="0"/>
+              </a:ext>
+            </a:extLst>
+          </a:blip>
+          <a:srcRect l="18938" t="24085"/>
+          <a:stretch/>
+        </p:blipFill>
+        <p:spPr bwMode="auto">
+          <a:xfrm>
+            <a:off x="259976" y="5803900"/>
+            <a:ext cx="2762759" cy="1054100"/>
+          </a:xfrm>
+          <a:prstGeom prst="rect">
+            <a:avLst/>
+          </a:prstGeom>
+          <a:noFill/>
+          <a:extLst>
+            <a:ext uri="{909E8E84-426E-40DD-AFC4-6F175D3DCCD1}">
+              <a14:hiddenFill xmlns:a14="http://schemas.microsoft.com/office/drawing/2010/main">
+                <a:solidFill>
+                  <a:srgbClr val="FFFFFF"/>
+                </a:solidFill>
+              </a14:hiddenFill>
+            </a:ext>
+          </a:extLst>
+        </p:spPr>
+      </p:pic>
+      <p:pic>
+        <p:nvPicPr>
+          <p:cNvPr id="9" name="Imagem 8">
+            <a:extLst>
+              <a:ext uri="{FF2B5EF4-FFF2-40B4-BE49-F238E27FC236}">
+                <a16:creationId xmlns:a16="http://schemas.microsoft.com/office/drawing/2014/main" id="{BC4368CE-25D6-7CA9-559D-8C6222DF2902}"/>
+              </a:ext>
+            </a:extLst>
+          </p:cNvPr>
+          <p:cNvPicPr>
+            <a:picLocks noChangeAspect="1"/>
+          </p:cNvPicPr>
+          <p:nvPr/>
+        </p:nvPicPr>
+        <p:blipFill>
+          <a:blip r:embed="rId6"/>
+          <a:stretch>
+            <a:fillRect/>
+          </a:stretch>
+        </p:blipFill>
+        <p:spPr>
+          <a:xfrm>
+            <a:off x="2961466" y="4319006"/>
+            <a:ext cx="6269068" cy="647436"/>
+          </a:xfrm>
+          <a:prstGeom prst="rect">
+            <a:avLst/>
+          </a:prstGeom>
+        </p:spPr>
+      </p:pic>
+      <p:sp>
+        <p:nvSpPr>
+          <p:cNvPr id="10" name="Retângulo 9">
+            <a:extLst>
+              <a:ext uri="{FF2B5EF4-FFF2-40B4-BE49-F238E27FC236}">
+                <a16:creationId xmlns:a16="http://schemas.microsoft.com/office/drawing/2014/main" id="{3113CB22-0BA8-C475-00B6-863A69FDABF0}"/>
+              </a:ext>
+            </a:extLst>
+          </p:cNvPr>
+          <p:cNvSpPr/>
+          <p:nvPr/>
+        </p:nvSpPr>
+        <p:spPr>
+          <a:xfrm>
+            <a:off x="4613088" y="5242183"/>
+            <a:ext cx="2965824" cy="1340279"/>
+          </a:xfrm>
+          <a:prstGeom prst="rect">
+            <a:avLst/>
+          </a:prstGeom>
+          <a:solidFill>
+            <a:schemeClr val="bg1"/>
+          </a:solidFill>
+        </p:spPr>
+        <p:style>
+          <a:lnRef idx="2">
+            <a:schemeClr val="accent1">
+              <a:shade val="15000"/>
+            </a:schemeClr>
+          </a:lnRef>
+          <a:fillRef idx="1">
+            <a:schemeClr val="accent1"/>
+          </a:fillRef>
+          <a:effectRef idx="0">
+            <a:schemeClr val="accent1"/>
+          </a:effectRef>
+          <a:fontRef idx="minor">
+            <a:schemeClr val="lt1"/>
+          </a:fontRef>
+        </p:style>
+        <p:txBody>
+          <a:bodyPr rtlCol="0" anchor="ctr"/>
+          <a:lstStyle/>
+          <a:p>
+            <a:pPr algn="just"/>
+            <a:r>
+              <a:rPr lang="pt-BR" sz="1800" dirty="0">
+                <a:solidFill>
+                  <a:schemeClr val="tx1"/>
+                </a:solidFill>
+              </a:rPr>
+              <a:t>Onde </a:t>
+            </a:r>
+            <a:r>
+              <a:rPr lang="pt-BR" sz="1800" dirty="0" err="1">
+                <a:solidFill>
+                  <a:schemeClr val="tx1"/>
+                </a:solidFill>
+              </a:rPr>
+              <a:t>dist</a:t>
+            </a:r>
+            <a:r>
+              <a:rPr lang="pt-BR" sz="1800" dirty="0">
+                <a:solidFill>
+                  <a:schemeClr val="tx1"/>
+                </a:solidFill>
+              </a:rPr>
+              <a:t>(</a:t>
+            </a:r>
+            <a:r>
+              <a:rPr lang="pt-BR" sz="1800" dirty="0" err="1">
+                <a:solidFill>
+                  <a:schemeClr val="tx1"/>
+                </a:solidFill>
+              </a:rPr>
+              <a:t>xi,xj</a:t>
+            </a:r>
+            <a:r>
+              <a:rPr lang="pt-BR" sz="1800" dirty="0">
+                <a:solidFill>
+                  <a:schemeClr val="tx1"/>
+                </a:solidFill>
+              </a:rPr>
+              <a:t>) é a distância euclidiana </a:t>
+            </a:r>
+            <a:r>
+              <a:rPr lang="pt-BR" sz="1800" dirty="0" err="1">
+                <a:solidFill>
+                  <a:schemeClr val="tx1"/>
+                </a:solidFill>
+              </a:rPr>
+              <a:t>intercluster</a:t>
+            </a:r>
+            <a:r>
+              <a:rPr lang="pt-BR" sz="1800" dirty="0">
+                <a:solidFill>
+                  <a:schemeClr val="tx1"/>
+                </a:solidFill>
+              </a:rPr>
+              <a:t> das amostras xi e </a:t>
+            </a:r>
+            <a:r>
+              <a:rPr lang="pt-BR" sz="1800" dirty="0" err="1">
+                <a:solidFill>
+                  <a:schemeClr val="tx1"/>
+                </a:solidFill>
+              </a:rPr>
+              <a:t>xj</a:t>
+            </a:r>
+            <a:endParaRPr lang="pt-BR" sz="1800" dirty="0">
+              <a:solidFill>
+                <a:schemeClr val="tx1"/>
+              </a:solidFill>
+            </a:endParaRPr>
+          </a:p>
+        </p:txBody>
+      </p:sp>
+      <p:sp>
+        <p:nvSpPr>
+          <p:cNvPr id="6" name="Retângulo 5">
+            <a:extLst>
+              <a:ext uri="{FF2B5EF4-FFF2-40B4-BE49-F238E27FC236}">
+                <a16:creationId xmlns:a16="http://schemas.microsoft.com/office/drawing/2014/main" id="{74DC83E7-0627-A615-9C7A-DD43D5FD18EC}"/>
+              </a:ext>
+            </a:extLst>
+          </p:cNvPr>
+          <p:cNvSpPr/>
+          <p:nvPr/>
+        </p:nvSpPr>
+        <p:spPr>
+          <a:xfrm>
+            <a:off x="11712388" y="6349004"/>
+            <a:ext cx="439271" cy="480110"/>
+          </a:xfrm>
+          <a:prstGeom prst="rect">
+            <a:avLst/>
+          </a:prstGeom>
+          <a:solidFill>
+            <a:schemeClr val="bg1"/>
+          </a:solidFill>
+          <a:ln>
+            <a:solidFill>
+              <a:schemeClr val="bg1"/>
+            </a:solidFill>
+          </a:ln>
+        </p:spPr>
+        <p:style>
+          <a:lnRef idx="2">
+            <a:schemeClr val="accent1">
+              <a:shade val="15000"/>
+            </a:schemeClr>
+          </a:lnRef>
+          <a:fillRef idx="1">
+            <a:schemeClr val="accent1"/>
+          </a:fillRef>
+          <a:effectRef idx="0">
+            <a:schemeClr val="accent1"/>
+          </a:effectRef>
+          <a:fontRef idx="minor">
+            <a:schemeClr val="lt1"/>
+          </a:fontRef>
+        </p:style>
+        <p:txBody>
+          <a:bodyPr rtlCol="0" anchor="ctr"/>
+          <a:lstStyle/>
+          <a:p>
+            <a:pPr algn="ctr"/>
+            <a:r>
+              <a:rPr lang="pt-BR" sz="1200" dirty="0">
+                <a:solidFill>
+                  <a:schemeClr val="tx1"/>
+                </a:solidFill>
+              </a:rPr>
+              <a:t>10</a:t>
+            </a:r>
+          </a:p>
+        </p:txBody>
+      </p:sp>
+    </p:spTree>
+    <p:extLst>
+      <p:ext uri="{BB962C8B-B14F-4D97-AF65-F5344CB8AC3E}">
+        <p14:creationId xmlns:p14="http://schemas.microsoft.com/office/powerpoint/2010/main" val="3192409845"/>
       </p:ext>
     </p:extLst>
   </p:cSld>

</xml_diff>